<commit_message>
Added Previous Vertex Cache
</commit_message>
<xml_diff>
--- a/docs/slides/Dijkstras new.pptx
+++ b/docs/slides/Dijkstras new.pptx
@@ -4,6 +4,9 @@
   <p:sldMasterIdLst>
     <p:sldMasterId id="2147483731" r:id="rId1"/>
   </p:sldMasterIdLst>
+  <p:notesMasterIdLst>
+    <p:notesMasterId r:id="rId28"/>
+  </p:notesMasterIdLst>
   <p:sldIdLst>
     <p:sldId id="256" r:id="rId2"/>
     <p:sldId id="259" r:id="rId3"/>
@@ -29,7 +32,8 @@
     <p:sldId id="261" r:id="rId23"/>
     <p:sldId id="262" r:id="rId24"/>
     <p:sldId id="263" r:id="rId25"/>
-    <p:sldId id="264" r:id="rId26"/>
+    <p:sldId id="285" r:id="rId26"/>
+    <p:sldId id="264" r:id="rId27"/>
   </p:sldIdLst>
   <p:sldSz cx="12192000" cy="6858000"/>
   <p:notesSz cx="6858000" cy="9144000"/>
@@ -136,6 +140,355 @@
 </p:presentation>
 </file>
 
+<file path=ppt/notesMasters/notesMaster1.xml><?xml version="1.0" encoding="utf-8"?>
+<p:notesMaster xmlns:a="http://schemas.openxmlformats.org/drawingml/2006/main" xmlns:r="http://schemas.openxmlformats.org/officeDocument/2006/relationships" xmlns:p="http://schemas.openxmlformats.org/presentationml/2006/main">
+  <p:cSld>
+    <p:bg>
+      <p:bgRef idx="1001">
+        <a:schemeClr val="bg1"/>
+      </p:bgRef>
+    </p:bg>
+    <p:spTree>
+      <p:nvGrpSpPr>
+        <p:cNvPr id="1" name=""/>
+        <p:cNvGrpSpPr/>
+        <p:nvPr/>
+      </p:nvGrpSpPr>
+      <p:grpSpPr>
+        <a:xfrm>
+          <a:off x="0" y="0"/>
+          <a:ext cx="0" cy="0"/>
+          <a:chOff x="0" y="0"/>
+          <a:chExt cx="0" cy="0"/>
+        </a:xfrm>
+      </p:grpSpPr>
+      <p:sp>
+        <p:nvSpPr>
+          <p:cNvPr id="2" name="Header Placeholder 1"/>
+          <p:cNvSpPr>
+            <a:spLocks noGrp="1"/>
+          </p:cNvSpPr>
+          <p:nvPr>
+            <p:ph type="hdr" sz="quarter"/>
+          </p:nvPr>
+        </p:nvSpPr>
+        <p:spPr>
+          <a:xfrm>
+            <a:off x="0" y="0"/>
+            <a:ext cx="2971800" cy="458788"/>
+          </a:xfrm>
+          <a:prstGeom prst="rect">
+            <a:avLst/>
+          </a:prstGeom>
+        </p:spPr>
+        <p:txBody>
+          <a:bodyPr vert="horz" lIns="91440" tIns="45720" rIns="91440" bIns="45720" rtlCol="0"/>
+          <a:lstStyle>
+            <a:lvl1pPr algn="l">
+              <a:defRPr sz="1200"/>
+            </a:lvl1pPr>
+          </a:lstStyle>
+          <a:p>
+            <a:endParaRPr lang="en-US"/>
+          </a:p>
+        </p:txBody>
+      </p:sp>
+      <p:sp>
+        <p:nvSpPr>
+          <p:cNvPr id="3" name="Date Placeholder 2"/>
+          <p:cNvSpPr>
+            <a:spLocks noGrp="1"/>
+          </p:cNvSpPr>
+          <p:nvPr>
+            <p:ph type="dt" idx="1"/>
+          </p:nvPr>
+        </p:nvSpPr>
+        <p:spPr>
+          <a:xfrm>
+            <a:off x="3884613" y="0"/>
+            <a:ext cx="2971800" cy="458788"/>
+          </a:xfrm>
+          <a:prstGeom prst="rect">
+            <a:avLst/>
+          </a:prstGeom>
+        </p:spPr>
+        <p:txBody>
+          <a:bodyPr vert="horz" lIns="91440" tIns="45720" rIns="91440" bIns="45720" rtlCol="0"/>
+          <a:lstStyle>
+            <a:lvl1pPr algn="r">
+              <a:defRPr sz="1200"/>
+            </a:lvl1pPr>
+          </a:lstStyle>
+          <a:p>
+            <a:fld id="{6E74C390-E8C2-4EE0-B491-4127262073BF}" type="datetimeFigureOut">
+              <a:rPr lang="en-US" smtClean="0"/>
+              <a:t>6/14/2021</a:t>
+            </a:fld>
+            <a:endParaRPr lang="en-US"/>
+          </a:p>
+        </p:txBody>
+      </p:sp>
+      <p:sp>
+        <p:nvSpPr>
+          <p:cNvPr id="4" name="Slide Image Placeholder 3"/>
+          <p:cNvSpPr>
+            <a:spLocks noGrp="1" noRot="1" noChangeAspect="1"/>
+          </p:cNvSpPr>
+          <p:nvPr>
+            <p:ph type="sldImg" idx="2"/>
+          </p:nvPr>
+        </p:nvSpPr>
+        <p:spPr>
+          <a:xfrm>
+            <a:off x="685800" y="1143000"/>
+            <a:ext cx="5486400" cy="3086100"/>
+          </a:xfrm>
+          <a:prstGeom prst="rect">
+            <a:avLst/>
+          </a:prstGeom>
+          <a:noFill/>
+          <a:ln w="12700">
+            <a:solidFill>
+              <a:prstClr val="black"/>
+            </a:solidFill>
+          </a:ln>
+        </p:spPr>
+        <p:txBody>
+          <a:bodyPr vert="horz" lIns="91440" tIns="45720" rIns="91440" bIns="45720" rtlCol="0" anchor="ctr"/>
+          <a:lstStyle/>
+          <a:p>
+            <a:endParaRPr lang="en-US"/>
+          </a:p>
+        </p:txBody>
+      </p:sp>
+      <p:sp>
+        <p:nvSpPr>
+          <p:cNvPr id="5" name="Notes Placeholder 4"/>
+          <p:cNvSpPr>
+            <a:spLocks noGrp="1"/>
+          </p:cNvSpPr>
+          <p:nvPr>
+            <p:ph type="body" sz="quarter" idx="3"/>
+          </p:nvPr>
+        </p:nvSpPr>
+        <p:spPr>
+          <a:xfrm>
+            <a:off x="685800" y="4400550"/>
+            <a:ext cx="5486400" cy="3600450"/>
+          </a:xfrm>
+          <a:prstGeom prst="rect">
+            <a:avLst/>
+          </a:prstGeom>
+        </p:spPr>
+        <p:txBody>
+          <a:bodyPr vert="horz" lIns="91440" tIns="45720" rIns="91440" bIns="45720" rtlCol="0"/>
+          <a:lstStyle/>
+          <a:p>
+            <a:pPr lvl="0"/>
+            <a:r>
+              <a:rPr lang="en-US"/>
+              <a:t>Click to edit Master text styles</a:t>
+            </a:r>
+          </a:p>
+          <a:p>
+            <a:pPr lvl="1"/>
+            <a:r>
+              <a:rPr lang="en-US"/>
+              <a:t>Second level</a:t>
+            </a:r>
+          </a:p>
+          <a:p>
+            <a:pPr lvl="2"/>
+            <a:r>
+              <a:rPr lang="en-US"/>
+              <a:t>Third level</a:t>
+            </a:r>
+          </a:p>
+          <a:p>
+            <a:pPr lvl="3"/>
+            <a:r>
+              <a:rPr lang="en-US"/>
+              <a:t>Fourth level</a:t>
+            </a:r>
+          </a:p>
+          <a:p>
+            <a:pPr lvl="4"/>
+            <a:r>
+              <a:rPr lang="en-US"/>
+              <a:t>Fifth level</a:t>
+            </a:r>
+          </a:p>
+        </p:txBody>
+      </p:sp>
+      <p:sp>
+        <p:nvSpPr>
+          <p:cNvPr id="6" name="Footer Placeholder 5"/>
+          <p:cNvSpPr>
+            <a:spLocks noGrp="1"/>
+          </p:cNvSpPr>
+          <p:nvPr>
+            <p:ph type="ftr" sz="quarter" idx="4"/>
+          </p:nvPr>
+        </p:nvSpPr>
+        <p:spPr>
+          <a:xfrm>
+            <a:off x="0" y="8685213"/>
+            <a:ext cx="2971800" cy="458787"/>
+          </a:xfrm>
+          <a:prstGeom prst="rect">
+            <a:avLst/>
+          </a:prstGeom>
+        </p:spPr>
+        <p:txBody>
+          <a:bodyPr vert="horz" lIns="91440" tIns="45720" rIns="91440" bIns="45720" rtlCol="0" anchor="b"/>
+          <a:lstStyle>
+            <a:lvl1pPr algn="l">
+              <a:defRPr sz="1200"/>
+            </a:lvl1pPr>
+          </a:lstStyle>
+          <a:p>
+            <a:endParaRPr lang="en-US"/>
+          </a:p>
+        </p:txBody>
+      </p:sp>
+      <p:sp>
+        <p:nvSpPr>
+          <p:cNvPr id="7" name="Slide Number Placeholder 6"/>
+          <p:cNvSpPr>
+            <a:spLocks noGrp="1"/>
+          </p:cNvSpPr>
+          <p:nvPr>
+            <p:ph type="sldNum" sz="quarter" idx="5"/>
+          </p:nvPr>
+        </p:nvSpPr>
+        <p:spPr>
+          <a:xfrm>
+            <a:off x="3884613" y="8685213"/>
+            <a:ext cx="2971800" cy="458787"/>
+          </a:xfrm>
+          <a:prstGeom prst="rect">
+            <a:avLst/>
+          </a:prstGeom>
+        </p:spPr>
+        <p:txBody>
+          <a:bodyPr vert="horz" lIns="91440" tIns="45720" rIns="91440" bIns="45720" rtlCol="0" anchor="b"/>
+          <a:lstStyle>
+            <a:lvl1pPr algn="r">
+              <a:defRPr sz="1200"/>
+            </a:lvl1pPr>
+          </a:lstStyle>
+          <a:p>
+            <a:fld id="{607B465A-8414-4FC7-AB40-1B4F354AC0A8}" type="slidenum">
+              <a:rPr lang="en-US" smtClean="0"/>
+              <a:t>‹#›</a:t>
+            </a:fld>
+            <a:endParaRPr lang="en-US"/>
+          </a:p>
+        </p:txBody>
+      </p:sp>
+    </p:spTree>
+    <p:extLst>
+      <p:ext uri="{BB962C8B-B14F-4D97-AF65-F5344CB8AC3E}">
+        <p14:creationId xmlns:p14="http://schemas.microsoft.com/office/powerpoint/2010/main" val="4233580356"/>
+      </p:ext>
+    </p:extLst>
+  </p:cSld>
+  <p:clrMap bg1="lt1" tx1="dk1" bg2="lt2" tx2="dk2" accent1="accent1" accent2="accent2" accent3="accent3" accent4="accent4" accent5="accent5" accent6="accent6" hlink="hlink" folHlink="folHlink"/>
+  <p:notesStyle>
+    <a:lvl1pPr marL="0" algn="l" defTabSz="914400" rtl="0" eaLnBrk="1" latinLnBrk="0" hangingPunct="1">
+      <a:defRPr sz="1200" kern="1200">
+        <a:solidFill>
+          <a:schemeClr val="tx1"/>
+        </a:solidFill>
+        <a:latin typeface="+mn-lt"/>
+        <a:ea typeface="+mn-ea"/>
+        <a:cs typeface="+mn-cs"/>
+      </a:defRPr>
+    </a:lvl1pPr>
+    <a:lvl2pPr marL="457200" algn="l" defTabSz="914400" rtl="0" eaLnBrk="1" latinLnBrk="0" hangingPunct="1">
+      <a:defRPr sz="1200" kern="1200">
+        <a:solidFill>
+          <a:schemeClr val="tx1"/>
+        </a:solidFill>
+        <a:latin typeface="+mn-lt"/>
+        <a:ea typeface="+mn-ea"/>
+        <a:cs typeface="+mn-cs"/>
+      </a:defRPr>
+    </a:lvl2pPr>
+    <a:lvl3pPr marL="914400" algn="l" defTabSz="914400" rtl="0" eaLnBrk="1" latinLnBrk="0" hangingPunct="1">
+      <a:defRPr sz="1200" kern="1200">
+        <a:solidFill>
+          <a:schemeClr val="tx1"/>
+        </a:solidFill>
+        <a:latin typeface="+mn-lt"/>
+        <a:ea typeface="+mn-ea"/>
+        <a:cs typeface="+mn-cs"/>
+      </a:defRPr>
+    </a:lvl3pPr>
+    <a:lvl4pPr marL="1371600" algn="l" defTabSz="914400" rtl="0" eaLnBrk="1" latinLnBrk="0" hangingPunct="1">
+      <a:defRPr sz="1200" kern="1200">
+        <a:solidFill>
+          <a:schemeClr val="tx1"/>
+        </a:solidFill>
+        <a:latin typeface="+mn-lt"/>
+        <a:ea typeface="+mn-ea"/>
+        <a:cs typeface="+mn-cs"/>
+      </a:defRPr>
+    </a:lvl4pPr>
+    <a:lvl5pPr marL="1828800" algn="l" defTabSz="914400" rtl="0" eaLnBrk="1" latinLnBrk="0" hangingPunct="1">
+      <a:defRPr sz="1200" kern="1200">
+        <a:solidFill>
+          <a:schemeClr val="tx1"/>
+        </a:solidFill>
+        <a:latin typeface="+mn-lt"/>
+        <a:ea typeface="+mn-ea"/>
+        <a:cs typeface="+mn-cs"/>
+      </a:defRPr>
+    </a:lvl5pPr>
+    <a:lvl6pPr marL="2286000" algn="l" defTabSz="914400" rtl="0" eaLnBrk="1" latinLnBrk="0" hangingPunct="1">
+      <a:defRPr sz="1200" kern="1200">
+        <a:solidFill>
+          <a:schemeClr val="tx1"/>
+        </a:solidFill>
+        <a:latin typeface="+mn-lt"/>
+        <a:ea typeface="+mn-ea"/>
+        <a:cs typeface="+mn-cs"/>
+      </a:defRPr>
+    </a:lvl6pPr>
+    <a:lvl7pPr marL="2743200" algn="l" defTabSz="914400" rtl="0" eaLnBrk="1" latinLnBrk="0" hangingPunct="1">
+      <a:defRPr sz="1200" kern="1200">
+        <a:solidFill>
+          <a:schemeClr val="tx1"/>
+        </a:solidFill>
+        <a:latin typeface="+mn-lt"/>
+        <a:ea typeface="+mn-ea"/>
+        <a:cs typeface="+mn-cs"/>
+      </a:defRPr>
+    </a:lvl7pPr>
+    <a:lvl8pPr marL="3200400" algn="l" defTabSz="914400" rtl="0" eaLnBrk="1" latinLnBrk="0" hangingPunct="1">
+      <a:defRPr sz="1200" kern="1200">
+        <a:solidFill>
+          <a:schemeClr val="tx1"/>
+        </a:solidFill>
+        <a:latin typeface="+mn-lt"/>
+        <a:ea typeface="+mn-ea"/>
+        <a:cs typeface="+mn-cs"/>
+      </a:defRPr>
+    </a:lvl8pPr>
+    <a:lvl9pPr marL="3657600" algn="l" defTabSz="914400" rtl="0" eaLnBrk="1" latinLnBrk="0" hangingPunct="1">
+      <a:defRPr sz="1200" kern="1200">
+        <a:solidFill>
+          <a:schemeClr val="tx1"/>
+        </a:solidFill>
+        <a:latin typeface="+mn-lt"/>
+        <a:ea typeface="+mn-ea"/>
+        <a:cs typeface="+mn-cs"/>
+      </a:defRPr>
+    </a:lvl9pPr>
+  </p:notesStyle>
+</p:notesMaster>
+</file>
+
 <file path=ppt/slideLayouts/slideLayout1.xml><?xml version="1.0" encoding="utf-8"?>
 <p:sldLayout xmlns:a="http://schemas.openxmlformats.org/drawingml/2006/main" xmlns:r="http://schemas.openxmlformats.org/officeDocument/2006/relationships" xmlns:p="http://schemas.openxmlformats.org/presentationml/2006/main" type="title" preserve="1">
   <p:cSld name="Title Slide">
@@ -322,9 +675,9 @@
           <a:bodyPr/>
           <a:lstStyle/>
           <a:p>
-            <a:fld id="{50AE447D-0A2D-48A7-86D4-68C242D2CFCD}" type="datetimeFigureOut">
+            <a:fld id="{89F07F3C-E0CA-469A-BED0-3EBBA8B164EA}" type="datetime1">
               <a:rPr lang="en-US" smtClean="0"/>
-              <a:t>1/10/2020</a:t>
+              <a:t>6/14/2021</a:t>
             </a:fld>
             <a:endParaRPr lang="en-US"/>
           </a:p>
@@ -660,9 +1013,9 @@
           <a:bodyPr/>
           <a:lstStyle/>
           <a:p>
-            <a:fld id="{50AE447D-0A2D-48A7-86D4-68C242D2CFCD}" type="datetimeFigureOut">
+            <a:fld id="{5BC4E7C3-885C-465A-B5F7-CC8DD2DA048C}" type="datetime1">
               <a:rPr lang="en-US" smtClean="0"/>
-              <a:t>1/10/2020</a:t>
+              <a:t>6/14/2021</a:t>
             </a:fld>
             <a:endParaRPr lang="en-US"/>
           </a:p>
@@ -1061,9 +1414,9 @@
           <a:bodyPr/>
           <a:lstStyle/>
           <a:p>
-            <a:fld id="{50AE447D-0A2D-48A7-86D4-68C242D2CFCD}" type="datetimeFigureOut">
+            <a:fld id="{700FC33B-5F18-4EEE-83AF-DF7029D03C35}" type="datetime1">
               <a:rPr lang="en-US" smtClean="0"/>
-              <a:t>1/10/2020</a:t>
+              <a:t>6/14/2021</a:t>
             </a:fld>
             <a:endParaRPr lang="en-US"/>
           </a:p>
@@ -1397,9 +1750,9 @@
           <a:bodyPr/>
           <a:lstStyle/>
           <a:p>
-            <a:fld id="{50AE447D-0A2D-48A7-86D4-68C242D2CFCD}" type="datetimeFigureOut">
+            <a:fld id="{CDE5B073-87B1-43F0-B196-E537C27CE593}" type="datetime1">
               <a:rPr lang="en-US" smtClean="0"/>
-              <a:t>1/10/2020</a:t>
+              <a:t>6/14/2021</a:t>
             </a:fld>
             <a:endParaRPr lang="en-US"/>
           </a:p>
@@ -1717,9 +2070,9 @@
           <a:bodyPr/>
           <a:lstStyle/>
           <a:p>
-            <a:fld id="{50AE447D-0A2D-48A7-86D4-68C242D2CFCD}" type="datetimeFigureOut">
+            <a:fld id="{41A338D1-B104-423B-AA6C-E86DE01400E5}" type="datetime1">
               <a:rPr lang="en-US" smtClean="0"/>
-              <a:t>1/10/2020</a:t>
+              <a:t>6/14/2021</a:t>
             </a:fld>
             <a:endParaRPr lang="en-US"/>
           </a:p>
@@ -2113,9 +2466,9 @@
           <a:bodyPr/>
           <a:lstStyle/>
           <a:p>
-            <a:fld id="{50AE447D-0A2D-48A7-86D4-68C242D2CFCD}" type="datetimeFigureOut">
+            <a:fld id="{B5D00C84-6808-4D42-9169-A095498C4DB3}" type="datetime1">
               <a:rPr lang="en-US" smtClean="0"/>
-              <a:t>1/10/2020</a:t>
+              <a:t>6/14/2021</a:t>
             </a:fld>
             <a:endParaRPr lang="en-US"/>
           </a:p>
@@ -2370,9 +2723,9 @@
           <a:bodyPr/>
           <a:lstStyle/>
           <a:p>
-            <a:fld id="{50AE447D-0A2D-48A7-86D4-68C242D2CFCD}" type="datetimeFigureOut">
+            <a:fld id="{D2D63D15-298E-407B-B3F2-8A2A8B8FB0C2}" type="datetime1">
               <a:rPr lang="en-US" smtClean="0"/>
-              <a:t>1/10/2020</a:t>
+              <a:t>6/14/2021</a:t>
             </a:fld>
             <a:endParaRPr lang="en-US"/>
           </a:p>
@@ -2632,9 +2985,9 @@
           <a:bodyPr/>
           <a:lstStyle/>
           <a:p>
-            <a:fld id="{50AE447D-0A2D-48A7-86D4-68C242D2CFCD}" type="datetimeFigureOut">
+            <a:fld id="{213C9FB4-3A29-4B27-9D2E-D844B7CEB194}" type="datetime1">
               <a:rPr lang="en-US" smtClean="0"/>
-              <a:t>1/10/2020</a:t>
+              <a:t>6/14/2021</a:t>
             </a:fld>
             <a:endParaRPr lang="en-US"/>
           </a:p>
@@ -2894,9 +3247,9 @@
           <a:bodyPr/>
           <a:lstStyle/>
           <a:p>
-            <a:fld id="{50AE447D-0A2D-48A7-86D4-68C242D2CFCD}" type="datetimeFigureOut">
+            <a:fld id="{5C3814C0-51F9-4396-84E4-3A927767350A}" type="datetime1">
               <a:rPr lang="en-US" smtClean="0"/>
-              <a:t>1/10/2020</a:t>
+              <a:t>6/14/2021</a:t>
             </a:fld>
             <a:endParaRPr lang="en-US"/>
           </a:p>
@@ -3223,9 +3576,9 @@
           <a:bodyPr/>
           <a:lstStyle/>
           <a:p>
-            <a:fld id="{50AE447D-0A2D-48A7-86D4-68C242D2CFCD}" type="datetimeFigureOut">
+            <a:fld id="{7805DB5B-0FA7-4461-81C4-CCCED5D0AFB5}" type="datetime1">
               <a:rPr lang="en-US" smtClean="0"/>
-              <a:t>1/10/2020</a:t>
+              <a:t>6/14/2021</a:t>
             </a:fld>
             <a:endParaRPr lang="en-US"/>
           </a:p>
@@ -3546,9 +3899,9 @@
           <a:bodyPr/>
           <a:lstStyle/>
           <a:p>
-            <a:fld id="{50AE447D-0A2D-48A7-86D4-68C242D2CFCD}" type="datetimeFigureOut">
+            <a:fld id="{FA4C6DA1-3FC3-4C39-95D4-88692956E5C5}" type="datetime1">
               <a:rPr lang="en-US" smtClean="0"/>
-              <a:t>1/10/2020</a:t>
+              <a:t>6/14/2021</a:t>
             </a:fld>
             <a:endParaRPr lang="en-US"/>
           </a:p>
@@ -4003,9 +4356,9 @@
           <a:bodyPr/>
           <a:lstStyle/>
           <a:p>
-            <a:fld id="{50AE447D-0A2D-48A7-86D4-68C242D2CFCD}" type="datetimeFigureOut">
+            <a:fld id="{F51A20AC-0251-4853-AE5A-562BBD5E6CA1}" type="datetime1">
               <a:rPr lang="en-US" smtClean="0"/>
-              <a:t>1/10/2020</a:t>
+              <a:t>6/14/2021</a:t>
             </a:fld>
             <a:endParaRPr lang="en-US"/>
           </a:p>
@@ -4208,9 +4561,9 @@
           <a:bodyPr/>
           <a:lstStyle/>
           <a:p>
-            <a:fld id="{50AE447D-0A2D-48A7-86D4-68C242D2CFCD}" type="datetimeFigureOut">
+            <a:fld id="{A10CF940-F53A-4FD0-B64E-9E4C8951A429}" type="datetime1">
               <a:rPr lang="en-US" smtClean="0"/>
-              <a:t>1/10/2020</a:t>
+              <a:t>6/14/2021</a:t>
             </a:fld>
             <a:endParaRPr lang="en-US"/>
           </a:p>
@@ -4385,9 +4738,9 @@
           <a:bodyPr/>
           <a:lstStyle/>
           <a:p>
-            <a:fld id="{50AE447D-0A2D-48A7-86D4-68C242D2CFCD}" type="datetimeFigureOut">
+            <a:fld id="{DA23B40D-29FE-45CF-85D2-B57536A8F1F0}" type="datetime1">
               <a:rPr lang="en-US" smtClean="0"/>
-              <a:t>1/10/2020</a:t>
+              <a:t>6/14/2021</a:t>
             </a:fld>
             <a:endParaRPr lang="en-US"/>
           </a:p>
@@ -4718,9 +5071,9 @@
           <a:bodyPr/>
           <a:lstStyle/>
           <a:p>
-            <a:fld id="{50AE447D-0A2D-48A7-86D4-68C242D2CFCD}" type="datetimeFigureOut">
+            <a:fld id="{17ED92A5-D1A9-4C1F-BA67-DCA9F905B50C}" type="datetime1">
               <a:rPr lang="en-US" smtClean="0"/>
-              <a:t>1/10/2020</a:t>
+              <a:t>6/14/2021</a:t>
             </a:fld>
             <a:endParaRPr lang="en-US"/>
           </a:p>
@@ -5063,9 +5416,9 @@
           <a:bodyPr/>
           <a:lstStyle/>
           <a:p>
-            <a:fld id="{50AE447D-0A2D-48A7-86D4-68C242D2CFCD}" type="datetimeFigureOut">
+            <a:fld id="{37215BBB-18F3-4CFF-B253-F19A0C1DD548}" type="datetime1">
               <a:rPr lang="en-US" smtClean="0"/>
-              <a:t>1/10/2020</a:t>
+              <a:t>6/14/2021</a:t>
             </a:fld>
             <a:endParaRPr lang="en-US"/>
           </a:p>
@@ -7180,9 +7533,9 @@
             </a:lvl1pPr>
           </a:lstStyle>
           <a:p>
-            <a:fld id="{50AE447D-0A2D-48A7-86D4-68C242D2CFCD}" type="datetimeFigureOut">
+            <a:fld id="{17EB4ADB-81D0-4BDC-AF82-F37831D1867D}" type="datetime1">
               <a:rPr lang="en-US" smtClean="0"/>
-              <a:t>1/10/2020</a:t>
+              <a:t>6/14/2021</a:t>
             </a:fld>
             <a:endParaRPr lang="en-US"/>
           </a:p>
@@ -7290,6 +7643,7 @@
     <p:sldLayoutId id="2147483746" r:id="rId15"/>
     <p:sldLayoutId id="2147483747" r:id="rId16"/>
   </p:sldLayoutIdLst>
+  <p:hf hdr="0" ftr="0" dt="0"/>
   <p:txStyles>
     <p:titleStyle>
       <a:lvl1pPr algn="l" defTabSz="457200" rtl="0" eaLnBrk="1" latinLnBrk="0" hangingPunct="1">
@@ -7705,7 +8059,7 @@
           <p:cNvPr id="2" name="Title 1">
             <a:extLst>
               <a:ext uri="{FF2B5EF4-FFF2-40B4-BE49-F238E27FC236}">
-                <a16:creationId xmlns:a16="http://schemas.microsoft.com/office/drawing/2014/main" xmlns="" id="{1F5202B5-B418-4C80-9D4D-8BBCA21E0337}"/>
+                <a16:creationId xmlns:a16="http://schemas.microsoft.com/office/drawing/2014/main" id="{1F5202B5-B418-4C80-9D4D-8BBCA21E0337}"/>
               </a:ext>
             </a:extLst>
           </p:cNvPr>
@@ -7739,7 +8093,7 @@
           <p:cNvPr id="3" name="Subtitle 2">
             <a:extLst>
               <a:ext uri="{FF2B5EF4-FFF2-40B4-BE49-F238E27FC236}">
-                <a16:creationId xmlns:a16="http://schemas.microsoft.com/office/drawing/2014/main" xmlns="" id="{CE205166-F649-4C71-9046-BBDF55997BED}"/>
+                <a16:creationId xmlns:a16="http://schemas.microsoft.com/office/drawing/2014/main" id="{CE205166-F649-4C71-9046-BBDF55997BED}"/>
               </a:ext>
             </a:extLst>
           </p:cNvPr>
@@ -7765,6 +8119,35 @@
               <a:t>      </a:t>
             </a:r>
             <a:endParaRPr lang="en-US" dirty="0"/>
+          </a:p>
+        </p:txBody>
+      </p:sp>
+      <p:sp>
+        <p:nvSpPr>
+          <p:cNvPr id="4" name="Slide Number Placeholder 3">
+            <a:extLst>
+              <a:ext uri="{FF2B5EF4-FFF2-40B4-BE49-F238E27FC236}">
+                <a16:creationId xmlns:a16="http://schemas.microsoft.com/office/drawing/2014/main" id="{7B7AF27C-DB4C-4606-88B8-D3AB1F7854C3}"/>
+              </a:ext>
+            </a:extLst>
+          </p:cNvPr>
+          <p:cNvSpPr>
+            <a:spLocks noGrp="1"/>
+          </p:cNvSpPr>
+          <p:nvPr>
+            <p:ph type="sldNum" sz="quarter" idx="12"/>
+          </p:nvPr>
+        </p:nvSpPr>
+        <p:spPr/>
+        <p:txBody>
+          <a:bodyPr/>
+          <a:lstStyle/>
+          <a:p>
+            <a:fld id="{2B25DBF2-E2F2-498E-8F35-AC746470812A}" type="slidenum">
+              <a:rPr lang="en-US" smtClean="0"/>
+              <a:t>1</a:t>
+            </a:fld>
+            <a:endParaRPr lang="en-US"/>
           </a:p>
         </p:txBody>
       </p:sp>
@@ -7827,6 +8210,35 @@
           </a:xfrm>
         </p:spPr>
       </p:pic>
+      <p:sp>
+        <p:nvSpPr>
+          <p:cNvPr id="2" name="Slide Number Placeholder 1">
+            <a:extLst>
+              <a:ext uri="{FF2B5EF4-FFF2-40B4-BE49-F238E27FC236}">
+                <a16:creationId xmlns:a16="http://schemas.microsoft.com/office/drawing/2014/main" id="{89EB7655-6B69-49D4-8D10-62B8404F539A}"/>
+              </a:ext>
+            </a:extLst>
+          </p:cNvPr>
+          <p:cNvSpPr>
+            <a:spLocks noGrp="1"/>
+          </p:cNvSpPr>
+          <p:nvPr>
+            <p:ph type="sldNum" sz="quarter" idx="12"/>
+          </p:nvPr>
+        </p:nvSpPr>
+        <p:spPr/>
+        <p:txBody>
+          <a:bodyPr/>
+          <a:lstStyle/>
+          <a:p>
+            <a:fld id="{2B25DBF2-E2F2-498E-8F35-AC746470812A}" type="slidenum">
+              <a:rPr lang="en-US" smtClean="0"/>
+              <a:t>10</a:t>
+            </a:fld>
+            <a:endParaRPr lang="en-US"/>
+          </a:p>
+        </p:txBody>
+      </p:sp>
     </p:spTree>
     <p:extLst>
       <p:ext uri="{BB962C8B-B14F-4D97-AF65-F5344CB8AC3E}">
@@ -7886,6 +8298,35 @@
           </a:xfrm>
         </p:spPr>
       </p:pic>
+      <p:sp>
+        <p:nvSpPr>
+          <p:cNvPr id="2" name="Slide Number Placeholder 1">
+            <a:extLst>
+              <a:ext uri="{FF2B5EF4-FFF2-40B4-BE49-F238E27FC236}">
+                <a16:creationId xmlns:a16="http://schemas.microsoft.com/office/drawing/2014/main" id="{3B935156-C79C-4F18-9658-8139705E0289}"/>
+              </a:ext>
+            </a:extLst>
+          </p:cNvPr>
+          <p:cNvSpPr>
+            <a:spLocks noGrp="1"/>
+          </p:cNvSpPr>
+          <p:nvPr>
+            <p:ph type="sldNum" sz="quarter" idx="12"/>
+          </p:nvPr>
+        </p:nvSpPr>
+        <p:spPr/>
+        <p:txBody>
+          <a:bodyPr/>
+          <a:lstStyle/>
+          <a:p>
+            <a:fld id="{2B25DBF2-E2F2-498E-8F35-AC746470812A}" type="slidenum">
+              <a:rPr lang="en-US" smtClean="0"/>
+              <a:t>11</a:t>
+            </a:fld>
+            <a:endParaRPr lang="en-US"/>
+          </a:p>
+        </p:txBody>
+      </p:sp>
     </p:spTree>
     <p:extLst>
       <p:ext uri="{BB962C8B-B14F-4D97-AF65-F5344CB8AC3E}">
@@ -7945,6 +8386,35 @@
           </a:xfrm>
         </p:spPr>
       </p:pic>
+      <p:sp>
+        <p:nvSpPr>
+          <p:cNvPr id="2" name="Slide Number Placeholder 1">
+            <a:extLst>
+              <a:ext uri="{FF2B5EF4-FFF2-40B4-BE49-F238E27FC236}">
+                <a16:creationId xmlns:a16="http://schemas.microsoft.com/office/drawing/2014/main" id="{F4E5FCEA-898A-44FD-8146-E7E254DAA7AD}"/>
+              </a:ext>
+            </a:extLst>
+          </p:cNvPr>
+          <p:cNvSpPr>
+            <a:spLocks noGrp="1"/>
+          </p:cNvSpPr>
+          <p:nvPr>
+            <p:ph type="sldNum" sz="quarter" idx="12"/>
+          </p:nvPr>
+        </p:nvSpPr>
+        <p:spPr/>
+        <p:txBody>
+          <a:bodyPr/>
+          <a:lstStyle/>
+          <a:p>
+            <a:fld id="{2B25DBF2-E2F2-498E-8F35-AC746470812A}" type="slidenum">
+              <a:rPr lang="en-US" smtClean="0"/>
+              <a:t>12</a:t>
+            </a:fld>
+            <a:endParaRPr lang="en-US"/>
+          </a:p>
+        </p:txBody>
+      </p:sp>
     </p:spTree>
     <p:extLst>
       <p:ext uri="{BB962C8B-B14F-4D97-AF65-F5344CB8AC3E}">
@@ -8004,6 +8474,35 @@
           </a:xfrm>
         </p:spPr>
       </p:pic>
+      <p:sp>
+        <p:nvSpPr>
+          <p:cNvPr id="2" name="Slide Number Placeholder 1">
+            <a:extLst>
+              <a:ext uri="{FF2B5EF4-FFF2-40B4-BE49-F238E27FC236}">
+                <a16:creationId xmlns:a16="http://schemas.microsoft.com/office/drawing/2014/main" id="{3C7BEA35-9D0F-4843-A421-EBBF16FC7B1C}"/>
+              </a:ext>
+            </a:extLst>
+          </p:cNvPr>
+          <p:cNvSpPr>
+            <a:spLocks noGrp="1"/>
+          </p:cNvSpPr>
+          <p:nvPr>
+            <p:ph type="sldNum" sz="quarter" idx="12"/>
+          </p:nvPr>
+        </p:nvSpPr>
+        <p:spPr/>
+        <p:txBody>
+          <a:bodyPr/>
+          <a:lstStyle/>
+          <a:p>
+            <a:fld id="{2B25DBF2-E2F2-498E-8F35-AC746470812A}" type="slidenum">
+              <a:rPr lang="en-US" smtClean="0"/>
+              <a:t>13</a:t>
+            </a:fld>
+            <a:endParaRPr lang="en-US"/>
+          </a:p>
+        </p:txBody>
+      </p:sp>
     </p:spTree>
     <p:extLst>
       <p:ext uri="{BB962C8B-B14F-4D97-AF65-F5344CB8AC3E}">
@@ -8063,6 +8562,35 @@
           </a:xfrm>
         </p:spPr>
       </p:pic>
+      <p:sp>
+        <p:nvSpPr>
+          <p:cNvPr id="2" name="Slide Number Placeholder 1">
+            <a:extLst>
+              <a:ext uri="{FF2B5EF4-FFF2-40B4-BE49-F238E27FC236}">
+                <a16:creationId xmlns:a16="http://schemas.microsoft.com/office/drawing/2014/main" id="{DAB407F4-4A12-4530-BDE7-E4A0FF257BE7}"/>
+              </a:ext>
+            </a:extLst>
+          </p:cNvPr>
+          <p:cNvSpPr>
+            <a:spLocks noGrp="1"/>
+          </p:cNvSpPr>
+          <p:nvPr>
+            <p:ph type="sldNum" sz="quarter" idx="12"/>
+          </p:nvPr>
+        </p:nvSpPr>
+        <p:spPr/>
+        <p:txBody>
+          <a:bodyPr/>
+          <a:lstStyle/>
+          <a:p>
+            <a:fld id="{2B25DBF2-E2F2-498E-8F35-AC746470812A}" type="slidenum">
+              <a:rPr lang="en-US" smtClean="0"/>
+              <a:t>14</a:t>
+            </a:fld>
+            <a:endParaRPr lang="en-US"/>
+          </a:p>
+        </p:txBody>
+      </p:sp>
     </p:spTree>
     <p:extLst>
       <p:ext uri="{BB962C8B-B14F-4D97-AF65-F5344CB8AC3E}">
@@ -8122,6 +8650,35 @@
           </a:xfrm>
         </p:spPr>
       </p:pic>
+      <p:sp>
+        <p:nvSpPr>
+          <p:cNvPr id="2" name="Slide Number Placeholder 1">
+            <a:extLst>
+              <a:ext uri="{FF2B5EF4-FFF2-40B4-BE49-F238E27FC236}">
+                <a16:creationId xmlns:a16="http://schemas.microsoft.com/office/drawing/2014/main" id="{D70CDAC3-E8F3-41CA-A55A-F0DAD6FB9C85}"/>
+              </a:ext>
+            </a:extLst>
+          </p:cNvPr>
+          <p:cNvSpPr>
+            <a:spLocks noGrp="1"/>
+          </p:cNvSpPr>
+          <p:nvPr>
+            <p:ph type="sldNum" sz="quarter" idx="12"/>
+          </p:nvPr>
+        </p:nvSpPr>
+        <p:spPr/>
+        <p:txBody>
+          <a:bodyPr/>
+          <a:lstStyle/>
+          <a:p>
+            <a:fld id="{2B25DBF2-E2F2-498E-8F35-AC746470812A}" type="slidenum">
+              <a:rPr lang="en-US" smtClean="0"/>
+              <a:t>15</a:t>
+            </a:fld>
+            <a:endParaRPr lang="en-US"/>
+          </a:p>
+        </p:txBody>
+      </p:sp>
     </p:spTree>
     <p:extLst>
       <p:ext uri="{BB962C8B-B14F-4D97-AF65-F5344CB8AC3E}">
@@ -8181,6 +8738,35 @@
           </a:xfrm>
         </p:spPr>
       </p:pic>
+      <p:sp>
+        <p:nvSpPr>
+          <p:cNvPr id="2" name="Slide Number Placeholder 1">
+            <a:extLst>
+              <a:ext uri="{FF2B5EF4-FFF2-40B4-BE49-F238E27FC236}">
+                <a16:creationId xmlns:a16="http://schemas.microsoft.com/office/drawing/2014/main" id="{2DE70DD6-4A1B-4AE5-887F-B00A958E57FC}"/>
+              </a:ext>
+            </a:extLst>
+          </p:cNvPr>
+          <p:cNvSpPr>
+            <a:spLocks noGrp="1"/>
+          </p:cNvSpPr>
+          <p:nvPr>
+            <p:ph type="sldNum" sz="quarter" idx="12"/>
+          </p:nvPr>
+        </p:nvSpPr>
+        <p:spPr/>
+        <p:txBody>
+          <a:bodyPr/>
+          <a:lstStyle/>
+          <a:p>
+            <a:fld id="{2B25DBF2-E2F2-498E-8F35-AC746470812A}" type="slidenum">
+              <a:rPr lang="en-US" smtClean="0"/>
+              <a:t>16</a:t>
+            </a:fld>
+            <a:endParaRPr lang="en-US"/>
+          </a:p>
+        </p:txBody>
+      </p:sp>
     </p:spTree>
     <p:extLst>
       <p:ext uri="{BB962C8B-B14F-4D97-AF65-F5344CB8AC3E}">
@@ -8240,6 +8826,35 @@
           </a:xfrm>
         </p:spPr>
       </p:pic>
+      <p:sp>
+        <p:nvSpPr>
+          <p:cNvPr id="2" name="Slide Number Placeholder 1">
+            <a:extLst>
+              <a:ext uri="{FF2B5EF4-FFF2-40B4-BE49-F238E27FC236}">
+                <a16:creationId xmlns:a16="http://schemas.microsoft.com/office/drawing/2014/main" id="{1E7D9297-9063-4F1B-A856-4D6FFAFEFBDC}"/>
+              </a:ext>
+            </a:extLst>
+          </p:cNvPr>
+          <p:cNvSpPr>
+            <a:spLocks noGrp="1"/>
+          </p:cNvSpPr>
+          <p:nvPr>
+            <p:ph type="sldNum" sz="quarter" idx="12"/>
+          </p:nvPr>
+        </p:nvSpPr>
+        <p:spPr/>
+        <p:txBody>
+          <a:bodyPr/>
+          <a:lstStyle/>
+          <a:p>
+            <a:fld id="{2B25DBF2-E2F2-498E-8F35-AC746470812A}" type="slidenum">
+              <a:rPr lang="en-US" smtClean="0"/>
+              <a:t>17</a:t>
+            </a:fld>
+            <a:endParaRPr lang="en-US"/>
+          </a:p>
+        </p:txBody>
+      </p:sp>
     </p:spTree>
     <p:extLst>
       <p:ext uri="{BB962C8B-B14F-4D97-AF65-F5344CB8AC3E}">
@@ -8299,6 +8914,35 @@
           </a:xfrm>
         </p:spPr>
       </p:pic>
+      <p:sp>
+        <p:nvSpPr>
+          <p:cNvPr id="2" name="Slide Number Placeholder 1">
+            <a:extLst>
+              <a:ext uri="{FF2B5EF4-FFF2-40B4-BE49-F238E27FC236}">
+                <a16:creationId xmlns:a16="http://schemas.microsoft.com/office/drawing/2014/main" id="{F8E24FD6-98D2-46B9-BE44-C6CB1DF8A90E}"/>
+              </a:ext>
+            </a:extLst>
+          </p:cNvPr>
+          <p:cNvSpPr>
+            <a:spLocks noGrp="1"/>
+          </p:cNvSpPr>
+          <p:nvPr>
+            <p:ph type="sldNum" sz="quarter" idx="12"/>
+          </p:nvPr>
+        </p:nvSpPr>
+        <p:spPr/>
+        <p:txBody>
+          <a:bodyPr/>
+          <a:lstStyle/>
+          <a:p>
+            <a:fld id="{2B25DBF2-E2F2-498E-8F35-AC746470812A}" type="slidenum">
+              <a:rPr lang="en-US" smtClean="0"/>
+              <a:t>18</a:t>
+            </a:fld>
+            <a:endParaRPr lang="en-US"/>
+          </a:p>
+        </p:txBody>
+      </p:sp>
     </p:spTree>
     <p:extLst>
       <p:ext uri="{BB962C8B-B14F-4D97-AF65-F5344CB8AC3E}">
@@ -8358,6 +9002,35 @@
           </a:xfrm>
         </p:spPr>
       </p:pic>
+      <p:sp>
+        <p:nvSpPr>
+          <p:cNvPr id="2" name="Slide Number Placeholder 1">
+            <a:extLst>
+              <a:ext uri="{FF2B5EF4-FFF2-40B4-BE49-F238E27FC236}">
+                <a16:creationId xmlns:a16="http://schemas.microsoft.com/office/drawing/2014/main" id="{D575612C-1464-4F7C-ACC9-1021C7BA9CAF}"/>
+              </a:ext>
+            </a:extLst>
+          </p:cNvPr>
+          <p:cNvSpPr>
+            <a:spLocks noGrp="1"/>
+          </p:cNvSpPr>
+          <p:nvPr>
+            <p:ph type="sldNum" sz="quarter" idx="12"/>
+          </p:nvPr>
+        </p:nvSpPr>
+        <p:spPr/>
+        <p:txBody>
+          <a:bodyPr/>
+          <a:lstStyle/>
+          <a:p>
+            <a:fld id="{2B25DBF2-E2F2-498E-8F35-AC746470812A}" type="slidenum">
+              <a:rPr lang="en-US" smtClean="0"/>
+              <a:t>19</a:t>
+            </a:fld>
+            <a:endParaRPr lang="en-US"/>
+          </a:p>
+        </p:txBody>
+      </p:sp>
     </p:spTree>
     <p:extLst>
       <p:ext uri="{BB962C8B-B14F-4D97-AF65-F5344CB8AC3E}">
@@ -8393,7 +9066,7 @@
           <p:cNvPr id="2" name="Title 1">
             <a:extLst>
               <a:ext uri="{FF2B5EF4-FFF2-40B4-BE49-F238E27FC236}">
-                <a16:creationId xmlns:a16="http://schemas.microsoft.com/office/drawing/2014/main" xmlns="" id="{53ECFFD8-63EF-4E6A-B04E-D4135CB284F7}"/>
+                <a16:creationId xmlns:a16="http://schemas.microsoft.com/office/drawing/2014/main" id="{53ECFFD8-63EF-4E6A-B04E-D4135CB284F7}"/>
               </a:ext>
             </a:extLst>
           </p:cNvPr>
@@ -8427,7 +9100,7 @@
           <p:cNvPr id="3" name="Content Placeholder 2">
             <a:extLst>
               <a:ext uri="{FF2B5EF4-FFF2-40B4-BE49-F238E27FC236}">
-                <a16:creationId xmlns:a16="http://schemas.microsoft.com/office/drawing/2014/main" xmlns="" id="{C3930121-2314-44EE-9C67-89773ADE0FCE}"/>
+                <a16:creationId xmlns:a16="http://schemas.microsoft.com/office/drawing/2014/main" id="{C3930121-2314-44EE-9C67-89773ADE0FCE}"/>
               </a:ext>
             </a:extLst>
           </p:cNvPr>
@@ -8450,26 +9123,13 @@
           <a:p>
             <a:r>
               <a:rPr lang="en-US" dirty="0"/>
-              <a:t>Is used to find the shortest path </a:t>
-            </a:r>
-            <a:r>
-              <a:rPr lang="en-US" dirty="0" smtClean="0"/>
-              <a:t>between a vertex and every other vertex.</a:t>
-            </a:r>
-            <a:endParaRPr lang="en-US" dirty="0"/>
+              <a:t>Is used to find the shortest path between a vertex and every other vertex.</a:t>
+            </a:r>
           </a:p>
           <a:p>
             <a:r>
               <a:rPr lang="en-US" dirty="0"/>
-              <a:t>Works for weighted </a:t>
-            </a:r>
-            <a:r>
-              <a:rPr lang="en-US" dirty="0" smtClean="0"/>
-              <a:t>graph</a:t>
-            </a:r>
-            <a:r>
-              <a:rPr lang="en-US" dirty="0"/>
-              <a:t>.</a:t>
+              <a:t>Works for weighted graph.</a:t>
             </a:r>
           </a:p>
           <a:p>
@@ -8480,6 +9140,35 @@
           </a:p>
           <a:p>
             <a:endParaRPr lang="en-US" dirty="0"/>
+          </a:p>
+        </p:txBody>
+      </p:sp>
+      <p:sp>
+        <p:nvSpPr>
+          <p:cNvPr id="4" name="Slide Number Placeholder 3">
+            <a:extLst>
+              <a:ext uri="{FF2B5EF4-FFF2-40B4-BE49-F238E27FC236}">
+                <a16:creationId xmlns:a16="http://schemas.microsoft.com/office/drawing/2014/main" id="{B0BC6DE1-5EE5-440B-8F87-24BCE15A0251}"/>
+              </a:ext>
+            </a:extLst>
+          </p:cNvPr>
+          <p:cNvSpPr>
+            <a:spLocks noGrp="1"/>
+          </p:cNvSpPr>
+          <p:nvPr>
+            <p:ph type="sldNum" sz="quarter" idx="12"/>
+          </p:nvPr>
+        </p:nvSpPr>
+        <p:spPr/>
+        <p:txBody>
+          <a:bodyPr/>
+          <a:lstStyle/>
+          <a:p>
+            <a:fld id="{2B25DBF2-E2F2-498E-8F35-AC746470812A}" type="slidenum">
+              <a:rPr lang="en-US" smtClean="0"/>
+              <a:t>2</a:t>
+            </a:fld>
+            <a:endParaRPr lang="en-US"/>
           </a:p>
         </p:txBody>
       </p:sp>
@@ -8542,6 +9231,35 @@
           </a:xfrm>
         </p:spPr>
       </p:pic>
+      <p:sp>
+        <p:nvSpPr>
+          <p:cNvPr id="2" name="Slide Number Placeholder 1">
+            <a:extLst>
+              <a:ext uri="{FF2B5EF4-FFF2-40B4-BE49-F238E27FC236}">
+                <a16:creationId xmlns:a16="http://schemas.microsoft.com/office/drawing/2014/main" id="{C67A4002-BA37-4748-A7E5-147A385B80CA}"/>
+              </a:ext>
+            </a:extLst>
+          </p:cNvPr>
+          <p:cNvSpPr>
+            <a:spLocks noGrp="1"/>
+          </p:cNvSpPr>
+          <p:nvPr>
+            <p:ph type="sldNum" sz="quarter" idx="12"/>
+          </p:nvPr>
+        </p:nvSpPr>
+        <p:spPr/>
+        <p:txBody>
+          <a:bodyPr/>
+          <a:lstStyle/>
+          <a:p>
+            <a:fld id="{2B25DBF2-E2F2-498E-8F35-AC746470812A}" type="slidenum">
+              <a:rPr lang="en-US" smtClean="0"/>
+              <a:t>20</a:t>
+            </a:fld>
+            <a:endParaRPr lang="en-US"/>
+          </a:p>
+        </p:txBody>
+      </p:sp>
     </p:spTree>
     <p:extLst>
       <p:ext uri="{BB962C8B-B14F-4D97-AF65-F5344CB8AC3E}">
@@ -8601,6 +9319,35 @@
           </a:xfrm>
         </p:spPr>
       </p:pic>
+      <p:sp>
+        <p:nvSpPr>
+          <p:cNvPr id="2" name="Slide Number Placeholder 1">
+            <a:extLst>
+              <a:ext uri="{FF2B5EF4-FFF2-40B4-BE49-F238E27FC236}">
+                <a16:creationId xmlns:a16="http://schemas.microsoft.com/office/drawing/2014/main" id="{911DDA52-1887-4F5B-B5BD-D3EB3ADFD667}"/>
+              </a:ext>
+            </a:extLst>
+          </p:cNvPr>
+          <p:cNvSpPr>
+            <a:spLocks noGrp="1"/>
+          </p:cNvSpPr>
+          <p:nvPr>
+            <p:ph type="sldNum" sz="quarter" idx="12"/>
+          </p:nvPr>
+        </p:nvSpPr>
+        <p:spPr/>
+        <p:txBody>
+          <a:bodyPr/>
+          <a:lstStyle/>
+          <a:p>
+            <a:fld id="{2B25DBF2-E2F2-498E-8F35-AC746470812A}" type="slidenum">
+              <a:rPr lang="en-US" smtClean="0"/>
+              <a:t>21</a:t>
+            </a:fld>
+            <a:endParaRPr lang="en-US"/>
+          </a:p>
+        </p:txBody>
+      </p:sp>
     </p:spTree>
     <p:extLst>
       <p:ext uri="{BB962C8B-B14F-4D97-AF65-F5344CB8AC3E}">
@@ -8636,7 +9383,7 @@
           <p:cNvPr id="2" name="Title 1">
             <a:extLst>
               <a:ext uri="{FF2B5EF4-FFF2-40B4-BE49-F238E27FC236}">
-                <a16:creationId xmlns:a16="http://schemas.microsoft.com/office/drawing/2014/main" xmlns="" id="{639E7D01-27A8-4325-8E24-721D0F6E5EDA}"/>
+                <a16:creationId xmlns:a16="http://schemas.microsoft.com/office/drawing/2014/main" id="{639E7D01-27A8-4325-8E24-721D0F6E5EDA}"/>
               </a:ext>
             </a:extLst>
           </p:cNvPr>
@@ -8669,7 +9416,7 @@
           <p:cNvPr id="3" name="Content Placeholder 2">
             <a:extLst>
               <a:ext uri="{FF2B5EF4-FFF2-40B4-BE49-F238E27FC236}">
-                <a16:creationId xmlns:a16="http://schemas.microsoft.com/office/drawing/2014/main" xmlns="" id="{A5E3251F-BB9B-4392-B4AF-572E658F65C3}"/>
+                <a16:creationId xmlns:a16="http://schemas.microsoft.com/office/drawing/2014/main" id="{A5E3251F-BB9B-4392-B4AF-572E658F65C3}"/>
               </a:ext>
             </a:extLst>
           </p:cNvPr>
@@ -8711,7 +9458,7 @@
           <p:cNvPr id="5" name="Picture 4">
             <a:extLst>
               <a:ext uri="{FF2B5EF4-FFF2-40B4-BE49-F238E27FC236}">
-                <a16:creationId xmlns:a16="http://schemas.microsoft.com/office/drawing/2014/main" xmlns="" id="{CDDA7671-DB9E-4D22-8135-95806FE09A71}"/>
+                <a16:creationId xmlns:a16="http://schemas.microsoft.com/office/drawing/2014/main" id="{CDDA7671-DB9E-4D22-8135-95806FE09A71}"/>
               </a:ext>
             </a:extLst>
           </p:cNvPr>
@@ -8742,12 +9489,41 @@
           </a:prstGeom>
         </p:spPr>
       </p:pic>
+      <p:sp>
+        <p:nvSpPr>
+          <p:cNvPr id="4" name="Slide Number Placeholder 3">
+            <a:extLst>
+              <a:ext uri="{FF2B5EF4-FFF2-40B4-BE49-F238E27FC236}">
+                <a16:creationId xmlns:a16="http://schemas.microsoft.com/office/drawing/2014/main" id="{9F6DA530-014A-4BDC-B5A6-1E2F72F364C3}"/>
+              </a:ext>
+            </a:extLst>
+          </p:cNvPr>
+          <p:cNvSpPr>
+            <a:spLocks noGrp="1"/>
+          </p:cNvSpPr>
+          <p:nvPr>
+            <p:ph type="sldNum" sz="quarter" idx="12"/>
+          </p:nvPr>
+        </p:nvSpPr>
+        <p:spPr/>
+        <p:txBody>
+          <a:bodyPr/>
+          <a:lstStyle/>
+          <a:p>
+            <a:fld id="{2B25DBF2-E2F2-498E-8F35-AC746470812A}" type="slidenum">
+              <a:rPr lang="en-US" smtClean="0"/>
+              <a:t>22</a:t>
+            </a:fld>
+            <a:endParaRPr lang="en-US"/>
+          </a:p>
+        </p:txBody>
+      </p:sp>
       <p:pic>
         <p:nvPicPr>
-          <p:cNvPr id="7" name="Picture 6">
+          <p:cNvPr id="8" name="Picture 7">
             <a:extLst>
               <a:ext uri="{FF2B5EF4-FFF2-40B4-BE49-F238E27FC236}">
-                <a16:creationId xmlns:a16="http://schemas.microsoft.com/office/drawing/2014/main" xmlns="" id="{BFE2D203-1351-4119-BC79-C284A7E7D4B8}"/>
+                <a16:creationId xmlns:a16="http://schemas.microsoft.com/office/drawing/2014/main" id="{FB8BBBA9-A77C-4897-BBB3-EC2DE88A439F}"/>
               </a:ext>
             </a:extLst>
           </p:cNvPr>
@@ -8770,8 +9546,8 @@
         </p:blipFill>
         <p:spPr>
           <a:xfrm>
-            <a:off x="6883791" y="1933134"/>
-            <a:ext cx="2933581" cy="3670589"/>
+            <a:off x="6658712" y="1859825"/>
+            <a:ext cx="3253565" cy="4310974"/>
           </a:xfrm>
           <a:prstGeom prst="rect">
             <a:avLst/>
@@ -8813,7 +9589,7 @@
           <p:cNvPr id="2" name="Title 1">
             <a:extLst>
               <a:ext uri="{FF2B5EF4-FFF2-40B4-BE49-F238E27FC236}">
-                <a16:creationId xmlns:a16="http://schemas.microsoft.com/office/drawing/2014/main" xmlns="" id="{51AAB094-748A-4D8B-A377-1FF7658A9E5F}"/>
+                <a16:creationId xmlns:a16="http://schemas.microsoft.com/office/drawing/2014/main" id="{51AAB094-748A-4D8B-A377-1FF7658A9E5F}"/>
               </a:ext>
             </a:extLst>
           </p:cNvPr>
@@ -8848,7 +9624,7 @@
           <p:cNvPr id="3" name="Content Placeholder 2">
             <a:extLst>
               <a:ext uri="{FF2B5EF4-FFF2-40B4-BE49-F238E27FC236}">
-                <a16:creationId xmlns:a16="http://schemas.microsoft.com/office/drawing/2014/main" xmlns="" id="{333A73C0-71E4-451A-ABE9-C626F01CBCC9}"/>
+                <a16:creationId xmlns:a16="http://schemas.microsoft.com/office/drawing/2014/main" id="{333A73C0-71E4-451A-ABE9-C626F01CBCC9}"/>
               </a:ext>
             </a:extLst>
           </p:cNvPr>
@@ -8950,7 +9726,7 @@
           <p:cNvPr id="9" name="Picture 8">
             <a:extLst>
               <a:ext uri="{FF2B5EF4-FFF2-40B4-BE49-F238E27FC236}">
-                <a16:creationId xmlns:a16="http://schemas.microsoft.com/office/drawing/2014/main" xmlns="" id="{351C0761-082F-4105-B934-267F147D5106}"/>
+                <a16:creationId xmlns:a16="http://schemas.microsoft.com/office/drawing/2014/main" id="{351C0761-082F-4105-B934-267F147D5106}"/>
               </a:ext>
             </a:extLst>
           </p:cNvPr>
@@ -8981,6 +9757,35 @@
           </a:prstGeom>
         </p:spPr>
       </p:pic>
+      <p:sp>
+        <p:nvSpPr>
+          <p:cNvPr id="4" name="Slide Number Placeholder 3">
+            <a:extLst>
+              <a:ext uri="{FF2B5EF4-FFF2-40B4-BE49-F238E27FC236}">
+                <a16:creationId xmlns:a16="http://schemas.microsoft.com/office/drawing/2014/main" id="{215B3942-B4F9-439C-909B-60F3626C1839}"/>
+              </a:ext>
+            </a:extLst>
+          </p:cNvPr>
+          <p:cNvSpPr>
+            <a:spLocks noGrp="1"/>
+          </p:cNvSpPr>
+          <p:nvPr>
+            <p:ph type="sldNum" sz="quarter" idx="12"/>
+          </p:nvPr>
+        </p:nvSpPr>
+        <p:spPr/>
+        <p:txBody>
+          <a:bodyPr/>
+          <a:lstStyle/>
+          <a:p>
+            <a:fld id="{2B25DBF2-E2F2-498E-8F35-AC746470812A}" type="slidenum">
+              <a:rPr lang="en-US" smtClean="0"/>
+              <a:t>23</a:t>
+            </a:fld>
+            <a:endParaRPr lang="en-US"/>
+          </a:p>
+        </p:txBody>
+      </p:sp>
     </p:spTree>
     <p:extLst>
       <p:ext uri="{BB962C8B-B14F-4D97-AF65-F5344CB8AC3E}">
@@ -9016,7 +9821,7 @@
           <p:cNvPr id="2" name="Title 1">
             <a:extLst>
               <a:ext uri="{FF2B5EF4-FFF2-40B4-BE49-F238E27FC236}">
-                <a16:creationId xmlns:a16="http://schemas.microsoft.com/office/drawing/2014/main" xmlns="" id="{E3E8486F-4A22-4960-965E-EEFE0AE3E346}"/>
+                <a16:creationId xmlns:a16="http://schemas.microsoft.com/office/drawing/2014/main" id="{E3E8486F-4A22-4960-965E-EEFE0AE3E346}"/>
               </a:ext>
             </a:extLst>
           </p:cNvPr>
@@ -9050,24 +9855,76 @@
       </p:sp>
       <p:sp>
         <p:nvSpPr>
-          <p:cNvPr id="12" name="Rectangle 6">
+          <p:cNvPr id="3" name="Slide Number Placeholder 2">
             <a:extLst>
               <a:ext uri="{FF2B5EF4-FFF2-40B4-BE49-F238E27FC236}">
-                <a16:creationId xmlns:a16="http://schemas.microsoft.com/office/drawing/2014/main" xmlns="" id="{8CA20BC2-71D2-4031-8D04-7DE7B1592B60}"/>
+                <a16:creationId xmlns:a16="http://schemas.microsoft.com/office/drawing/2014/main" id="{3075053E-5A8E-4EEF-9C81-C76F69585D3F}"/>
               </a:ext>
             </a:extLst>
           </p:cNvPr>
           <p:cNvSpPr>
-            <a:spLocks noGrp="1" noChangeArrowheads="1"/>
+            <a:spLocks noGrp="1"/>
+          </p:cNvSpPr>
+          <p:nvPr>
+            <p:ph type="sldNum" sz="quarter" idx="12"/>
+          </p:nvPr>
+        </p:nvSpPr>
+        <p:spPr/>
+        <p:txBody>
+          <a:bodyPr/>
+          <a:lstStyle/>
+          <a:p>
+            <a:fld id="{2B25DBF2-E2F2-498E-8F35-AC746470812A}" type="slidenum">
+              <a:rPr lang="en-US" smtClean="0"/>
+              <a:t>24</a:t>
+            </a:fld>
+            <a:endParaRPr lang="en-US"/>
+          </a:p>
+        </p:txBody>
+      </p:sp>
+      <p:sp>
+        <p:nvSpPr>
+          <p:cNvPr id="4" name="Content Placeholder 3">
+            <a:extLst>
+              <a:ext uri="{FF2B5EF4-FFF2-40B4-BE49-F238E27FC236}">
+                <a16:creationId xmlns:a16="http://schemas.microsoft.com/office/drawing/2014/main" id="{8DAEC314-2870-448F-A0CA-2857D84A838B}"/>
+              </a:ext>
+            </a:extLst>
+          </p:cNvPr>
+          <p:cNvSpPr>
+            <a:spLocks noGrp="1"/>
           </p:cNvSpPr>
           <p:nvPr>
             <p:ph idx="1"/>
           </p:nvPr>
+        </p:nvSpPr>
+        <p:spPr/>
+        <p:txBody>
+          <a:bodyPr/>
+          <a:lstStyle/>
+          <a:p>
+            <a:endParaRPr lang="en-US"/>
+          </a:p>
+        </p:txBody>
+      </p:sp>
+      <p:sp>
+        <p:nvSpPr>
+          <p:cNvPr id="6" name="Content Placeholder 1">
+            <a:extLst>
+              <a:ext uri="{FF2B5EF4-FFF2-40B4-BE49-F238E27FC236}">
+                <a16:creationId xmlns:a16="http://schemas.microsoft.com/office/drawing/2014/main" id="{28033515-8F64-46BF-8412-E2F1B5B03B62}"/>
+              </a:ext>
+            </a:extLst>
+          </p:cNvPr>
+          <p:cNvSpPr txBox="1">
+            <a:spLocks noChangeArrowheads="1"/>
+          </p:cNvSpPr>
+          <p:nvPr/>
         </p:nvSpPr>
         <p:spPr bwMode="auto">
           <a:xfrm>
-            <a:off x="819807" y="1525220"/>
-            <a:ext cx="11130456" cy="4401205"/>
+            <a:off x="1311579" y="1321075"/>
+            <a:ext cx="10193033" cy="4970591"/>
           </a:xfrm>
           <a:prstGeom prst="rect">
             <a:avLst/>
@@ -9102,18 +9959,232 @@
           </a:extLst>
         </p:spPr>
         <p:txBody>
-          <a:bodyPr vert="horz" wrap="square" lIns="91440" tIns="45720" rIns="91440" bIns="45720" numCol="1" anchor="ctr" anchorCtr="0" compatLnSpc="1">
+          <a:bodyPr vert="horz" wrap="square" lIns="91440" tIns="45720" rIns="91440" bIns="45720" numCol="1" rtlCol="0" anchor="ctr" anchorCtr="0" compatLnSpc="1">
             <a:prstTxWarp prst="textNoShape">
               <a:avLst/>
             </a:prstTxWarp>
             <a:spAutoFit/>
           </a:bodyPr>
-          <a:lstStyle/>
-          <a:p>
-            <a:pPr marL="0" marR="0" lvl="0" indent="0" algn="l" defTabSz="914400" rtl="0" eaLnBrk="0" fontAlgn="base" latinLnBrk="0" hangingPunct="0">
-              <a:lnSpc>
-                <a:spcPct val="100000"/>
-              </a:lnSpc>
+          <a:lstStyle>
+            <a:lvl1pPr marL="342900" indent="-342900" algn="l" defTabSz="457200" rtl="0" eaLnBrk="1" latinLnBrk="0" hangingPunct="1">
+              <a:spcBef>
+                <a:spcPts val="1000"/>
+              </a:spcBef>
+              <a:spcAft>
+                <a:spcPts val="0"/>
+              </a:spcAft>
+              <a:buClr>
+                <a:schemeClr val="accent1"/>
+              </a:buClr>
+              <a:buFont typeface="Wingdings 3" charset="2"/>
+              <a:buChar char=""/>
+              <a:defRPr sz="1800" kern="1200">
+                <a:solidFill>
+                  <a:schemeClr val="tx1">
+                    <a:lumMod val="75000"/>
+                    <a:lumOff val="25000"/>
+                  </a:schemeClr>
+                </a:solidFill>
+                <a:latin typeface="+mn-lt"/>
+                <a:ea typeface="+mn-ea"/>
+                <a:cs typeface="+mn-cs"/>
+              </a:defRPr>
+            </a:lvl1pPr>
+            <a:lvl2pPr marL="742950" indent="-285750" algn="l" defTabSz="457200" rtl="0" eaLnBrk="1" latinLnBrk="0" hangingPunct="1">
+              <a:spcBef>
+                <a:spcPts val="1000"/>
+              </a:spcBef>
+              <a:spcAft>
+                <a:spcPts val="0"/>
+              </a:spcAft>
+              <a:buClr>
+                <a:schemeClr val="accent1"/>
+              </a:buClr>
+              <a:buFont typeface="Wingdings 3" charset="2"/>
+              <a:buChar char=""/>
+              <a:defRPr sz="1600" kern="1200">
+                <a:solidFill>
+                  <a:schemeClr val="tx1">
+                    <a:lumMod val="75000"/>
+                    <a:lumOff val="25000"/>
+                  </a:schemeClr>
+                </a:solidFill>
+                <a:latin typeface="+mn-lt"/>
+                <a:ea typeface="+mn-ea"/>
+                <a:cs typeface="+mn-cs"/>
+              </a:defRPr>
+            </a:lvl2pPr>
+            <a:lvl3pPr marL="1143000" indent="-228600" algn="l" defTabSz="457200" rtl="0" eaLnBrk="1" latinLnBrk="0" hangingPunct="1">
+              <a:spcBef>
+                <a:spcPts val="1000"/>
+              </a:spcBef>
+              <a:spcAft>
+                <a:spcPts val="0"/>
+              </a:spcAft>
+              <a:buClr>
+                <a:schemeClr val="accent1"/>
+              </a:buClr>
+              <a:buFont typeface="Wingdings 3" charset="2"/>
+              <a:buChar char=""/>
+              <a:defRPr sz="1400" kern="1200">
+                <a:solidFill>
+                  <a:schemeClr val="tx1">
+                    <a:lumMod val="75000"/>
+                    <a:lumOff val="25000"/>
+                  </a:schemeClr>
+                </a:solidFill>
+                <a:latin typeface="+mn-lt"/>
+                <a:ea typeface="+mn-ea"/>
+                <a:cs typeface="+mn-cs"/>
+              </a:defRPr>
+            </a:lvl3pPr>
+            <a:lvl4pPr marL="1600200" indent="-228600" algn="l" defTabSz="457200" rtl="0" eaLnBrk="1" latinLnBrk="0" hangingPunct="1">
+              <a:spcBef>
+                <a:spcPts val="1000"/>
+              </a:spcBef>
+              <a:spcAft>
+                <a:spcPts val="0"/>
+              </a:spcAft>
+              <a:buClr>
+                <a:schemeClr val="accent1"/>
+              </a:buClr>
+              <a:buFont typeface="Wingdings 3" charset="2"/>
+              <a:buChar char=""/>
+              <a:defRPr sz="1200" kern="1200">
+                <a:solidFill>
+                  <a:schemeClr val="tx1">
+                    <a:lumMod val="75000"/>
+                    <a:lumOff val="25000"/>
+                  </a:schemeClr>
+                </a:solidFill>
+                <a:latin typeface="+mn-lt"/>
+                <a:ea typeface="+mn-ea"/>
+                <a:cs typeface="+mn-cs"/>
+              </a:defRPr>
+            </a:lvl4pPr>
+            <a:lvl5pPr marL="2057400" indent="-228600" algn="l" defTabSz="457200" rtl="0" eaLnBrk="1" latinLnBrk="0" hangingPunct="1">
+              <a:spcBef>
+                <a:spcPts val="1000"/>
+              </a:spcBef>
+              <a:spcAft>
+                <a:spcPts val="0"/>
+              </a:spcAft>
+              <a:buClr>
+                <a:schemeClr val="accent1"/>
+              </a:buClr>
+              <a:buFont typeface="Wingdings 3" charset="2"/>
+              <a:buChar char=""/>
+              <a:defRPr sz="1200" kern="1200">
+                <a:solidFill>
+                  <a:schemeClr val="tx1">
+                    <a:lumMod val="75000"/>
+                    <a:lumOff val="25000"/>
+                  </a:schemeClr>
+                </a:solidFill>
+                <a:latin typeface="+mn-lt"/>
+                <a:ea typeface="+mn-ea"/>
+                <a:cs typeface="+mn-cs"/>
+              </a:defRPr>
+            </a:lvl5pPr>
+            <a:lvl6pPr marL="2514600" indent="-228600" algn="l" defTabSz="457200" rtl="0" eaLnBrk="1" latinLnBrk="0" hangingPunct="1">
+              <a:spcBef>
+                <a:spcPts val="1000"/>
+              </a:spcBef>
+              <a:spcAft>
+                <a:spcPts val="0"/>
+              </a:spcAft>
+              <a:buClr>
+                <a:schemeClr val="accent1"/>
+              </a:buClr>
+              <a:buFont typeface="Wingdings 3" charset="2"/>
+              <a:buChar char=""/>
+              <a:defRPr sz="1200" kern="1200">
+                <a:solidFill>
+                  <a:schemeClr val="tx1">
+                    <a:lumMod val="75000"/>
+                    <a:lumOff val="25000"/>
+                  </a:schemeClr>
+                </a:solidFill>
+                <a:latin typeface="+mn-lt"/>
+                <a:ea typeface="+mn-ea"/>
+                <a:cs typeface="+mn-cs"/>
+              </a:defRPr>
+            </a:lvl6pPr>
+            <a:lvl7pPr marL="2971800" indent="-228600" algn="l" defTabSz="457200" rtl="0" eaLnBrk="1" latinLnBrk="0" hangingPunct="1">
+              <a:spcBef>
+                <a:spcPts val="1000"/>
+              </a:spcBef>
+              <a:spcAft>
+                <a:spcPts val="0"/>
+              </a:spcAft>
+              <a:buClr>
+                <a:schemeClr val="accent1"/>
+              </a:buClr>
+              <a:buFont typeface="Wingdings 3" charset="2"/>
+              <a:buChar char=""/>
+              <a:defRPr sz="1200" kern="1200">
+                <a:solidFill>
+                  <a:schemeClr val="tx1">
+                    <a:lumMod val="75000"/>
+                    <a:lumOff val="25000"/>
+                  </a:schemeClr>
+                </a:solidFill>
+                <a:latin typeface="+mn-lt"/>
+                <a:ea typeface="+mn-ea"/>
+                <a:cs typeface="+mn-cs"/>
+              </a:defRPr>
+            </a:lvl7pPr>
+            <a:lvl8pPr marL="3429000" indent="-228600" algn="l" defTabSz="457200" rtl="0" eaLnBrk="1" latinLnBrk="0" hangingPunct="1">
+              <a:spcBef>
+                <a:spcPts val="1000"/>
+              </a:spcBef>
+              <a:spcAft>
+                <a:spcPts val="0"/>
+              </a:spcAft>
+              <a:buClr>
+                <a:schemeClr val="accent1"/>
+              </a:buClr>
+              <a:buFont typeface="Wingdings 3" charset="2"/>
+              <a:buChar char=""/>
+              <a:defRPr sz="1200" kern="1200">
+                <a:solidFill>
+                  <a:schemeClr val="tx1">
+                    <a:lumMod val="75000"/>
+                    <a:lumOff val="25000"/>
+                  </a:schemeClr>
+                </a:solidFill>
+                <a:latin typeface="+mn-lt"/>
+                <a:ea typeface="+mn-ea"/>
+                <a:cs typeface="+mn-cs"/>
+              </a:defRPr>
+            </a:lvl8pPr>
+            <a:lvl9pPr marL="3886200" indent="-228600" algn="l" defTabSz="457200" rtl="0" eaLnBrk="1" latinLnBrk="0" hangingPunct="1">
+              <a:spcBef>
+                <a:spcPts val="1000"/>
+              </a:spcBef>
+              <a:spcAft>
+                <a:spcPts val="0"/>
+              </a:spcAft>
+              <a:buClr>
+                <a:schemeClr val="accent1"/>
+              </a:buClr>
+              <a:buFont typeface="Wingdings 3" charset="2"/>
+              <a:buChar char=""/>
+              <a:defRPr sz="1200" kern="1200">
+                <a:solidFill>
+                  <a:schemeClr val="tx1">
+                    <a:lumMod val="75000"/>
+                    <a:lumOff val="25000"/>
+                  </a:schemeClr>
+                </a:solidFill>
+                <a:latin typeface="+mn-lt"/>
+                <a:ea typeface="+mn-ea"/>
+                <a:cs typeface="+mn-cs"/>
+              </a:defRPr>
+            </a:lvl9pPr>
+          </a:lstStyle>
+          <a:p>
+            <a:pPr marL="0" indent="0" defTabSz="914400" eaLnBrk="0" fontAlgn="base" hangingPunct="0">
               <a:spcBef>
                 <a:spcPct val="0"/>
               </a:spcBef>
@@ -9121,1134 +10192,861 @@
                 <a:spcPct val="0"/>
               </a:spcAft>
               <a:buClrTx/>
-              <a:buSzTx/>
               <a:buFontTx/>
               <a:buNone/>
-              <a:tabLst/>
             </a:pPr>
             <a:r>
-              <a:rPr kumimoji="0" lang="en-US" altLang="en-US" sz="1400" b="0" i="0" u="none" strike="noStrike" cap="none" normalizeH="0" baseline="0">
-                <a:ln>
-                  <a:noFill/>
-                </a:ln>
+              <a:rPr lang="en-US" altLang="en-US" sz="1300">
                 <a:solidFill>
                   <a:srgbClr val="CC7832"/>
                 </a:solidFill>
-                <a:effectLst/>
                 <a:latin typeface="Courier New" panose="02070309020205020404" pitchFamily="49" charset="0"/>
                 <a:cs typeface="Courier New" panose="02070309020205020404" pitchFamily="49" charset="0"/>
               </a:rPr>
-              <a:t>private double </a:t>
-            </a:r>
-            <a:r>
-              <a:rPr kumimoji="0" lang="en-US" altLang="en-US" sz="1400" b="0" i="0" u="none" strike="noStrike" cap="none" normalizeH="0" baseline="0">
-                <a:ln>
-                  <a:noFill/>
-                </a:ln>
+              <a:t>public void </a:t>
+            </a:r>
+            <a:r>
+              <a:rPr lang="en-US" altLang="en-US" sz="1300">
                 <a:solidFill>
                   <a:srgbClr val="FFC66D"/>
                 </a:solidFill>
-                <a:effectLst/>
                 <a:latin typeface="Courier New" panose="02070309020205020404" pitchFamily="49" charset="0"/>
                 <a:cs typeface="Courier New" panose="02070309020205020404" pitchFamily="49" charset="0"/>
               </a:rPr>
               <a:t>shortestPathWeight</a:t>
             </a:r>
             <a:r>
-              <a:rPr kumimoji="0" lang="en-US" altLang="en-US" sz="1400" b="0" i="0" u="none" strike="noStrike" cap="none" normalizeH="0" baseline="0">
-                <a:ln>
-                  <a:noFill/>
-                </a:ln>
+              <a:rPr lang="en-US" altLang="en-US" sz="1300">
                 <a:solidFill>
                   <a:srgbClr val="A9B7C6"/>
                 </a:solidFill>
-                <a:effectLst/>
                 <a:latin typeface="Courier New" panose="02070309020205020404" pitchFamily="49" charset="0"/>
                 <a:cs typeface="Courier New" panose="02070309020205020404" pitchFamily="49" charset="0"/>
               </a:rPr>
               <a:t>(</a:t>
             </a:r>
             <a:r>
-              <a:rPr kumimoji="0" lang="en-US" altLang="en-US" sz="1400" b="0" i="0" u="none" strike="noStrike" cap="none" normalizeH="0" baseline="0">
-                <a:ln>
-                  <a:noFill/>
-                </a:ln>
+              <a:rPr lang="en-US" altLang="en-US" sz="1300">
                 <a:solidFill>
                   <a:srgbClr val="CC7832"/>
                 </a:solidFill>
-                <a:effectLst/>
                 <a:latin typeface="Courier New" panose="02070309020205020404" pitchFamily="49" charset="0"/>
                 <a:cs typeface="Courier New" panose="02070309020205020404" pitchFamily="49" charset="0"/>
               </a:rPr>
               <a:t>int </a:t>
             </a:r>
             <a:r>
-              <a:rPr kumimoji="0" lang="en-US" altLang="en-US" sz="1400" b="0" i="0" u="none" strike="noStrike" cap="none" normalizeH="0" baseline="0">
-                <a:ln>
-                  <a:noFill/>
-                </a:ln>
+              <a:rPr lang="en-US" altLang="en-US" sz="1300">
                 <a:solidFill>
                   <a:srgbClr val="A9B7C6"/>
                 </a:solidFill>
-                <a:effectLst/>
                 <a:latin typeface="Courier New" panose="02070309020205020404" pitchFamily="49" charset="0"/>
                 <a:cs typeface="Courier New" panose="02070309020205020404" pitchFamily="49" charset="0"/>
               </a:rPr>
-              <a:t>firstValue</a:t>
-            </a:r>
-            <a:r>
-              <a:rPr kumimoji="0" lang="en-US" altLang="en-US" sz="1400" b="0" i="0" u="none" strike="noStrike" cap="none" normalizeH="0" baseline="0">
-                <a:ln>
-                  <a:noFill/>
-                </a:ln>
-                <a:solidFill>
-                  <a:srgbClr val="CC7832"/>
-                </a:solidFill>
-                <a:effectLst/>
-                <a:latin typeface="Courier New" panose="02070309020205020404" pitchFamily="49" charset="0"/>
-                <a:cs typeface="Courier New" panose="02070309020205020404" pitchFamily="49" charset="0"/>
-              </a:rPr>
-              <a:t>, int </a:t>
-            </a:r>
-            <a:r>
-              <a:rPr kumimoji="0" lang="en-US" altLang="en-US" sz="1400" b="0" i="0" u="none" strike="noStrike" cap="none" normalizeH="0" baseline="0">
-                <a:ln>
-                  <a:noFill/>
-                </a:ln>
+              <a:t>value) {</a:t>
+            </a:r>
+            <a:br>
+              <a:rPr lang="en-US" altLang="en-US" sz="1300">
                 <a:solidFill>
                   <a:srgbClr val="A9B7C6"/>
                 </a:solidFill>
-                <a:effectLst/>
-                <a:latin typeface="Courier New" panose="02070309020205020404" pitchFamily="49" charset="0"/>
-                <a:cs typeface="Courier New" panose="02070309020205020404" pitchFamily="49" charset="0"/>
-              </a:rPr>
-              <a:t>secondValue) {</a:t>
-            </a:r>
-            <a:br>
-              <a:rPr kumimoji="0" lang="en-US" altLang="en-US" sz="1400" b="0" i="0" u="none" strike="noStrike" cap="none" normalizeH="0" baseline="0">
-                <a:ln>
-                  <a:noFill/>
-                </a:ln>
-                <a:solidFill>
-                  <a:srgbClr val="A9B7C6"/>
-                </a:solidFill>
-                <a:effectLst/>
                 <a:latin typeface="Courier New" panose="02070309020205020404" pitchFamily="49" charset="0"/>
                 <a:cs typeface="Courier New" panose="02070309020205020404" pitchFamily="49" charset="0"/>
               </a:rPr>
             </a:br>
             <a:r>
-              <a:rPr kumimoji="0" lang="en-US" altLang="en-US" sz="1400" b="0" i="0" u="none" strike="noStrike" cap="none" normalizeH="0" baseline="0">
-                <a:ln>
-                  <a:noFill/>
-                </a:ln>
+              <a:rPr lang="en-US" altLang="en-US" sz="1300">
                 <a:solidFill>
                   <a:srgbClr val="A9B7C6"/>
                 </a:solidFill>
-                <a:effectLst/>
                 <a:latin typeface="Courier New" panose="02070309020205020404" pitchFamily="49" charset="0"/>
                 <a:cs typeface="Courier New" panose="02070309020205020404" pitchFamily="49" charset="0"/>
               </a:rPr>
               <a:t>    setUpAll()</a:t>
             </a:r>
             <a:r>
-              <a:rPr kumimoji="0" lang="en-US" altLang="en-US" sz="1400" b="0" i="0" u="none" strike="noStrike" cap="none" normalizeH="0" baseline="0">
-                <a:ln>
-                  <a:noFill/>
-                </a:ln>
+              <a:rPr lang="en-US" altLang="en-US" sz="1300">
                 <a:solidFill>
                   <a:srgbClr val="CC7832"/>
                 </a:solidFill>
-                <a:effectLst/>
                 <a:latin typeface="Courier New" panose="02070309020205020404" pitchFamily="49" charset="0"/>
                 <a:cs typeface="Courier New" panose="02070309020205020404" pitchFamily="49" charset="0"/>
               </a:rPr>
               <a:t>;</a:t>
             </a:r>
             <a:br>
-              <a:rPr kumimoji="0" lang="en-US" altLang="en-US" sz="1400" b="0" i="0" u="none" strike="noStrike" cap="none" normalizeH="0" baseline="0">
-                <a:ln>
-                  <a:noFill/>
-                </a:ln>
+              <a:rPr lang="en-US" altLang="en-US" sz="1300">
                 <a:solidFill>
                   <a:srgbClr val="CC7832"/>
                 </a:solidFill>
-                <a:effectLst/>
                 <a:latin typeface="Courier New" panose="02070309020205020404" pitchFamily="49" charset="0"/>
                 <a:cs typeface="Courier New" panose="02070309020205020404" pitchFamily="49" charset="0"/>
               </a:rPr>
             </a:br>
             <a:r>
-              <a:rPr kumimoji="0" lang="en-US" altLang="en-US" sz="1400" b="0" i="0" u="none" strike="noStrike" cap="none" normalizeH="0" baseline="0">
-                <a:ln>
-                  <a:noFill/>
-                </a:ln>
+              <a:rPr lang="en-US" altLang="en-US" sz="1300">
                 <a:solidFill>
                   <a:srgbClr val="CC7832"/>
                 </a:solidFill>
-                <a:effectLst/>
                 <a:latin typeface="Courier New" panose="02070309020205020404" pitchFamily="49" charset="0"/>
                 <a:cs typeface="Courier New" panose="02070309020205020404" pitchFamily="49" charset="0"/>
               </a:rPr>
               <a:t>    </a:t>
             </a:r>
             <a:r>
-              <a:rPr kumimoji="0" lang="en-US" altLang="en-US" sz="1400" b="0" i="0" u="none" strike="noStrike" cap="none" normalizeH="0" baseline="0">
-                <a:ln>
-                  <a:noFill/>
-                </a:ln>
+              <a:rPr lang="en-US" altLang="en-US" sz="1300">
                 <a:solidFill>
                   <a:srgbClr val="A9B7C6"/>
                 </a:solidFill>
-                <a:effectLst/>
                 <a:latin typeface="Courier New" panose="02070309020205020404" pitchFamily="49" charset="0"/>
                 <a:cs typeface="Courier New" panose="02070309020205020404" pitchFamily="49" charset="0"/>
               </a:rPr>
-              <a:t>getVertex(firstValue).setDistance(</a:t>
-            </a:r>
-            <a:r>
-              <a:rPr kumimoji="0" lang="en-US" altLang="en-US" sz="1400" b="0" i="0" u="none" strike="noStrike" cap="none" normalizeH="0" baseline="0">
-                <a:ln>
-                  <a:noFill/>
-                </a:ln>
+              <a:t>getVertex(value).setDistance(</a:t>
+            </a:r>
+            <a:r>
+              <a:rPr lang="en-US" altLang="en-US" sz="1300">
                 <a:solidFill>
                   <a:srgbClr val="6897BB"/>
                 </a:solidFill>
-                <a:effectLst/>
                 <a:latin typeface="Courier New" panose="02070309020205020404" pitchFamily="49" charset="0"/>
                 <a:cs typeface="Courier New" panose="02070309020205020404" pitchFamily="49" charset="0"/>
               </a:rPr>
               <a:t>0</a:t>
             </a:r>
             <a:r>
-              <a:rPr kumimoji="0" lang="en-US" altLang="en-US" sz="1400" b="0" i="0" u="none" strike="noStrike" cap="none" normalizeH="0" baseline="0">
-                <a:ln>
-                  <a:noFill/>
-                </a:ln>
+              <a:rPr lang="en-US" altLang="en-US" sz="1300">
                 <a:solidFill>
                   <a:srgbClr val="A9B7C6"/>
                 </a:solidFill>
-                <a:effectLst/>
                 <a:latin typeface="Courier New" panose="02070309020205020404" pitchFamily="49" charset="0"/>
                 <a:cs typeface="Courier New" panose="02070309020205020404" pitchFamily="49" charset="0"/>
               </a:rPr>
               <a:t>)</a:t>
             </a:r>
             <a:r>
-              <a:rPr kumimoji="0" lang="en-US" altLang="en-US" sz="1400" b="0" i="0" u="none" strike="noStrike" cap="none" normalizeH="0" baseline="0">
-                <a:ln>
-                  <a:noFill/>
-                </a:ln>
+              <a:rPr lang="en-US" altLang="en-US" sz="1300">
                 <a:solidFill>
                   <a:srgbClr val="CC7832"/>
                 </a:solidFill>
-                <a:effectLst/>
                 <a:latin typeface="Courier New" panose="02070309020205020404" pitchFamily="49" charset="0"/>
                 <a:cs typeface="Courier New" panose="02070309020205020404" pitchFamily="49" charset="0"/>
               </a:rPr>
               <a:t>;</a:t>
             </a:r>
             <a:br>
-              <a:rPr kumimoji="0" lang="en-US" altLang="en-US" sz="1400" b="0" i="0" u="none" strike="noStrike" cap="none" normalizeH="0" baseline="0">
-                <a:ln>
-                  <a:noFill/>
-                </a:ln>
+              <a:rPr lang="en-US" altLang="en-US" sz="1300">
                 <a:solidFill>
                   <a:srgbClr val="CC7832"/>
                 </a:solidFill>
-                <a:effectLst/>
                 <a:latin typeface="Courier New" panose="02070309020205020404" pitchFamily="49" charset="0"/>
                 <a:cs typeface="Courier New" panose="02070309020205020404" pitchFamily="49" charset="0"/>
               </a:rPr>
             </a:br>
             <a:r>
-              <a:rPr kumimoji="0" lang="en-US" altLang="en-US" sz="1400" b="0" i="0" u="none" strike="noStrike" cap="none" normalizeH="0" baseline="0">
-                <a:ln>
-                  <a:noFill/>
-                </a:ln>
+              <a:rPr lang="en-US" altLang="en-US" sz="1300">
                 <a:solidFill>
                   <a:srgbClr val="CC7832"/>
                 </a:solidFill>
-                <a:effectLst/>
                 <a:latin typeface="Courier New" panose="02070309020205020404" pitchFamily="49" charset="0"/>
                 <a:cs typeface="Courier New" panose="02070309020205020404" pitchFamily="49" charset="0"/>
               </a:rPr>
               <a:t>    </a:t>
             </a:r>
             <a:r>
-              <a:rPr kumimoji="0" lang="en-US" altLang="en-US" sz="1400" b="0" i="0" u="none" strike="noStrike" cap="none" normalizeH="0" baseline="0">
-                <a:ln>
-                  <a:noFill/>
-                </a:ln>
+              <a:rPr lang="en-US" altLang="en-US" sz="1300">
                 <a:solidFill>
                   <a:srgbClr val="A9B7C6"/>
                 </a:solidFill>
-                <a:effectLst/>
                 <a:latin typeface="Courier New" panose="02070309020205020404" pitchFamily="49" charset="0"/>
                 <a:cs typeface="Courier New" panose="02070309020205020404" pitchFamily="49" charset="0"/>
               </a:rPr>
-              <a:t>Vertex currentVertex = getVertex(firstValue)</a:t>
-            </a:r>
-            <a:r>
-              <a:rPr kumimoji="0" lang="en-US" altLang="en-US" sz="1400" b="0" i="0" u="none" strike="noStrike" cap="none" normalizeH="0" baseline="0">
-                <a:ln>
-                  <a:noFill/>
-                </a:ln>
+              <a:t>getVertex(value).setPreviousVertexValue(value)</a:t>
+            </a:r>
+            <a:r>
+              <a:rPr lang="en-US" altLang="en-US" sz="1300">
                 <a:solidFill>
                   <a:srgbClr val="CC7832"/>
                 </a:solidFill>
-                <a:effectLst/>
                 <a:latin typeface="Courier New" panose="02070309020205020404" pitchFamily="49" charset="0"/>
                 <a:cs typeface="Courier New" panose="02070309020205020404" pitchFamily="49" charset="0"/>
               </a:rPr>
               <a:t>;</a:t>
             </a:r>
             <a:br>
-              <a:rPr kumimoji="0" lang="en-US" altLang="en-US" sz="1400" b="0" i="0" u="none" strike="noStrike" cap="none" normalizeH="0" baseline="0">
-                <a:ln>
-                  <a:noFill/>
-                </a:ln>
+              <a:rPr lang="en-US" altLang="en-US" sz="1300">
                 <a:solidFill>
                   <a:srgbClr val="CC7832"/>
                 </a:solidFill>
-                <a:effectLst/>
                 <a:latin typeface="Courier New" panose="02070309020205020404" pitchFamily="49" charset="0"/>
                 <a:cs typeface="Courier New" panose="02070309020205020404" pitchFamily="49" charset="0"/>
               </a:rPr>
             </a:br>
             <a:r>
-              <a:rPr kumimoji="0" lang="en-US" altLang="en-US" sz="1400" b="0" i="0" u="none" strike="noStrike" cap="none" normalizeH="0" baseline="0">
-                <a:ln>
-                  <a:noFill/>
-                </a:ln>
+              <a:rPr lang="en-US" altLang="en-US" sz="1300">
                 <a:solidFill>
                   <a:srgbClr val="CC7832"/>
                 </a:solidFill>
-                <a:effectLst/>
+                <a:latin typeface="Courier New" panose="02070309020205020404" pitchFamily="49" charset="0"/>
+                <a:cs typeface="Courier New" panose="02070309020205020404" pitchFamily="49" charset="0"/>
+              </a:rPr>
+              <a:t>    </a:t>
+            </a:r>
+            <a:r>
+              <a:rPr lang="en-US" altLang="en-US" sz="1300">
+                <a:solidFill>
+                  <a:srgbClr val="A9B7C6"/>
+                </a:solidFill>
+                <a:latin typeface="Courier New" panose="02070309020205020404" pitchFamily="49" charset="0"/>
+                <a:cs typeface="Courier New" panose="02070309020205020404" pitchFamily="49" charset="0"/>
+              </a:rPr>
+              <a:t>Vertex currentVertex = getVertex(value)</a:t>
+            </a:r>
+            <a:r>
+              <a:rPr lang="en-US" altLang="en-US" sz="1300">
+                <a:solidFill>
+                  <a:srgbClr val="CC7832"/>
+                </a:solidFill>
+                <a:latin typeface="Courier New" panose="02070309020205020404" pitchFamily="49" charset="0"/>
+                <a:cs typeface="Courier New" panose="02070309020205020404" pitchFamily="49" charset="0"/>
+              </a:rPr>
+              <a:t>;</a:t>
+            </a:r>
+            <a:br>
+              <a:rPr lang="en-US" altLang="en-US" sz="1300">
+                <a:solidFill>
+                  <a:srgbClr val="CC7832"/>
+                </a:solidFill>
+                <a:latin typeface="Courier New" panose="02070309020205020404" pitchFamily="49" charset="0"/>
+                <a:cs typeface="Courier New" panose="02070309020205020404" pitchFamily="49" charset="0"/>
+              </a:rPr>
+            </a:br>
+            <a:r>
+              <a:rPr lang="en-US" altLang="en-US" sz="1300">
+                <a:solidFill>
+                  <a:srgbClr val="CC7832"/>
+                </a:solidFill>
                 <a:latin typeface="Courier New" panose="02070309020205020404" pitchFamily="49" charset="0"/>
                 <a:cs typeface="Courier New" panose="02070309020205020404" pitchFamily="49" charset="0"/>
               </a:rPr>
               <a:t>    while </a:t>
             </a:r>
             <a:r>
-              <a:rPr kumimoji="0" lang="en-US" altLang="en-US" sz="1400" b="0" i="0" u="none" strike="noStrike" cap="none" normalizeH="0" baseline="0">
-                <a:ln>
-                  <a:noFill/>
-                </a:ln>
+              <a:rPr lang="en-US" altLang="en-US" sz="1300">
                 <a:solidFill>
                   <a:srgbClr val="A9B7C6"/>
                 </a:solidFill>
-                <a:effectLst/>
                 <a:latin typeface="Courier New" panose="02070309020205020404" pitchFamily="49" charset="0"/>
                 <a:cs typeface="Courier New" panose="02070309020205020404" pitchFamily="49" charset="0"/>
               </a:rPr>
               <a:t>(hasUnknown()) {</a:t>
             </a:r>
             <a:br>
-              <a:rPr kumimoji="0" lang="en-US" altLang="en-US" sz="1400" b="0" i="0" u="none" strike="noStrike" cap="none" normalizeH="0" baseline="0">
-                <a:ln>
-                  <a:noFill/>
-                </a:ln>
+              <a:rPr lang="en-US" altLang="en-US" sz="1300">
                 <a:solidFill>
                   <a:srgbClr val="A9B7C6"/>
                 </a:solidFill>
-                <a:effectLst/>
                 <a:latin typeface="Courier New" panose="02070309020205020404" pitchFamily="49" charset="0"/>
                 <a:cs typeface="Courier New" panose="02070309020205020404" pitchFamily="49" charset="0"/>
               </a:rPr>
             </a:br>
             <a:r>
-              <a:rPr kumimoji="0" lang="en-US" altLang="en-US" sz="1400" b="0" i="0" u="none" strike="noStrike" cap="none" normalizeH="0" baseline="0">
-                <a:ln>
-                  <a:noFill/>
-                </a:ln>
+              <a:rPr lang="en-US" altLang="en-US" sz="1300">
                 <a:solidFill>
                   <a:srgbClr val="A9B7C6"/>
                 </a:solidFill>
-                <a:effectLst/>
                 <a:latin typeface="Courier New" panose="02070309020205020404" pitchFamily="49" charset="0"/>
                 <a:cs typeface="Courier New" panose="02070309020205020404" pitchFamily="49" charset="0"/>
               </a:rPr>
               <a:t>        </a:t>
             </a:r>
             <a:r>
-              <a:rPr kumimoji="0" lang="en-US" altLang="en-US" sz="1400" b="0" i="0" u="none" strike="noStrike" cap="none" normalizeH="0" baseline="0">
-                <a:ln>
-                  <a:noFill/>
-                </a:ln>
+              <a:rPr lang="en-US" altLang="en-US" sz="1300">
                 <a:solidFill>
                   <a:srgbClr val="CC7832"/>
                 </a:solidFill>
-                <a:effectLst/>
                 <a:latin typeface="Courier New" panose="02070309020205020404" pitchFamily="49" charset="0"/>
                 <a:cs typeface="Courier New" panose="02070309020205020404" pitchFamily="49" charset="0"/>
               </a:rPr>
               <a:t>if </a:t>
             </a:r>
             <a:r>
-              <a:rPr kumimoji="0" lang="en-US" altLang="en-US" sz="1400" b="0" i="0" u="none" strike="noStrike" cap="none" normalizeH="0" baseline="0">
-                <a:ln>
-                  <a:noFill/>
-                </a:ln>
+              <a:rPr lang="en-US" altLang="en-US" sz="1300">
                 <a:solidFill>
                   <a:srgbClr val="A9B7C6"/>
                 </a:solidFill>
-                <a:effectLst/>
                 <a:latin typeface="Courier New" panose="02070309020205020404" pitchFamily="49" charset="0"/>
                 <a:cs typeface="Courier New" panose="02070309020205020404" pitchFamily="49" charset="0"/>
               </a:rPr>
               <a:t>(currentVertex == </a:t>
             </a:r>
             <a:r>
-              <a:rPr kumimoji="0" lang="en-US" altLang="en-US" sz="1400" b="0" i="0" u="none" strike="noStrike" cap="none" normalizeH="0" baseline="0">
-                <a:ln>
-                  <a:noFill/>
-                </a:ln>
+              <a:rPr lang="en-US" altLang="en-US" sz="1300">
                 <a:solidFill>
                   <a:srgbClr val="CC7832"/>
                 </a:solidFill>
-                <a:effectLst/>
                 <a:latin typeface="Courier New" panose="02070309020205020404" pitchFamily="49" charset="0"/>
                 <a:cs typeface="Courier New" panose="02070309020205020404" pitchFamily="49" charset="0"/>
               </a:rPr>
               <a:t>null</a:t>
             </a:r>
             <a:r>
-              <a:rPr kumimoji="0" lang="en-US" altLang="en-US" sz="1400" b="0" i="0" u="none" strike="noStrike" cap="none" normalizeH="0" baseline="0">
-                <a:ln>
-                  <a:noFill/>
-                </a:ln>
+              <a:rPr lang="en-US" altLang="en-US" sz="1300">
                 <a:solidFill>
                   <a:srgbClr val="A9B7C6"/>
                 </a:solidFill>
-                <a:effectLst/>
                 <a:latin typeface="Courier New" panose="02070309020205020404" pitchFamily="49" charset="0"/>
                 <a:cs typeface="Courier New" panose="02070309020205020404" pitchFamily="49" charset="0"/>
               </a:rPr>
               <a:t>) currentVertex = getOneUnknownVertex()</a:t>
             </a:r>
             <a:r>
-              <a:rPr kumimoji="0" lang="en-US" altLang="en-US" sz="1400" b="0" i="0" u="none" strike="noStrike" cap="none" normalizeH="0" baseline="0">
-                <a:ln>
-                  <a:noFill/>
-                </a:ln>
+              <a:rPr lang="en-US" altLang="en-US" sz="1300">
                 <a:solidFill>
                   <a:srgbClr val="CC7832"/>
                 </a:solidFill>
-                <a:effectLst/>
                 <a:latin typeface="Courier New" panose="02070309020205020404" pitchFamily="49" charset="0"/>
                 <a:cs typeface="Courier New" panose="02070309020205020404" pitchFamily="49" charset="0"/>
               </a:rPr>
               <a:t>;</a:t>
             </a:r>
             <a:br>
-              <a:rPr kumimoji="0" lang="en-US" altLang="en-US" sz="1400" b="0" i="0" u="none" strike="noStrike" cap="none" normalizeH="0" baseline="0">
-                <a:ln>
-                  <a:noFill/>
-                </a:ln>
+              <a:rPr lang="en-US" altLang="en-US" sz="1300">
                 <a:solidFill>
                   <a:srgbClr val="CC7832"/>
                 </a:solidFill>
-                <a:effectLst/>
                 <a:latin typeface="Courier New" panose="02070309020205020404" pitchFamily="49" charset="0"/>
                 <a:cs typeface="Courier New" panose="02070309020205020404" pitchFamily="49" charset="0"/>
               </a:rPr>
             </a:br>
             <a:r>
-              <a:rPr kumimoji="0" lang="en-US" altLang="en-US" sz="1400" b="0" i="0" u="none" strike="noStrike" cap="none" normalizeH="0" baseline="0">
-                <a:ln>
-                  <a:noFill/>
-                </a:ln>
+              <a:rPr lang="en-US" altLang="en-US" sz="1300">
                 <a:solidFill>
                   <a:srgbClr val="CC7832"/>
                 </a:solidFill>
-                <a:effectLst/>
                 <a:latin typeface="Courier New" panose="02070309020205020404" pitchFamily="49" charset="0"/>
                 <a:cs typeface="Courier New" panose="02070309020205020404" pitchFamily="49" charset="0"/>
               </a:rPr>
               <a:t>        </a:t>
             </a:r>
             <a:r>
-              <a:rPr kumimoji="0" lang="en-US" altLang="en-US" sz="1400" b="0" i="0" u="none" strike="noStrike" cap="none" normalizeH="0" baseline="0">
-                <a:ln>
-                  <a:noFill/>
-                </a:ln>
+              <a:rPr lang="en-US" altLang="en-US" sz="1300">
                 <a:solidFill>
                   <a:srgbClr val="A9B7C6"/>
                 </a:solidFill>
-                <a:effectLst/>
                 <a:latin typeface="Courier New" panose="02070309020205020404" pitchFamily="49" charset="0"/>
                 <a:cs typeface="Courier New" panose="02070309020205020404" pitchFamily="49" charset="0"/>
               </a:rPr>
               <a:t>ArrayList&lt;Edge&gt; edges = getEdges(currentVertex.getValue())</a:t>
             </a:r>
             <a:r>
-              <a:rPr kumimoji="0" lang="en-US" altLang="en-US" sz="1400" b="0" i="0" u="none" strike="noStrike" cap="none" normalizeH="0" baseline="0">
-                <a:ln>
-                  <a:noFill/>
-                </a:ln>
+              <a:rPr lang="en-US" altLang="en-US" sz="1300">
                 <a:solidFill>
                   <a:srgbClr val="CC7832"/>
                 </a:solidFill>
-                <a:effectLst/>
                 <a:latin typeface="Courier New" panose="02070309020205020404" pitchFamily="49" charset="0"/>
                 <a:cs typeface="Courier New" panose="02070309020205020404" pitchFamily="49" charset="0"/>
               </a:rPr>
               <a:t>;</a:t>
             </a:r>
             <a:br>
-              <a:rPr kumimoji="0" lang="en-US" altLang="en-US" sz="1400" b="0" i="0" u="none" strike="noStrike" cap="none" normalizeH="0" baseline="0">
-                <a:ln>
-                  <a:noFill/>
-                </a:ln>
+              <a:rPr lang="en-US" altLang="en-US" sz="1300">
                 <a:solidFill>
                   <a:srgbClr val="CC7832"/>
                 </a:solidFill>
-                <a:effectLst/>
                 <a:latin typeface="Courier New" panose="02070309020205020404" pitchFamily="49" charset="0"/>
                 <a:cs typeface="Courier New" panose="02070309020205020404" pitchFamily="49" charset="0"/>
               </a:rPr>
             </a:br>
             <a:r>
-              <a:rPr kumimoji="0" lang="en-US" altLang="en-US" sz="1400" b="0" i="0" u="none" strike="noStrike" cap="none" normalizeH="0" baseline="0">
-                <a:ln>
-                  <a:noFill/>
-                </a:ln>
+              <a:rPr lang="en-US" altLang="en-US" sz="1300">
                 <a:solidFill>
                   <a:srgbClr val="CC7832"/>
                 </a:solidFill>
-                <a:effectLst/>
                 <a:latin typeface="Courier New" panose="02070309020205020404" pitchFamily="49" charset="0"/>
                 <a:cs typeface="Courier New" panose="02070309020205020404" pitchFamily="49" charset="0"/>
               </a:rPr>
               <a:t>        </a:t>
             </a:r>
             <a:r>
-              <a:rPr kumimoji="0" lang="en-US" altLang="en-US" sz="1400" b="0" i="0" u="none" strike="noStrike" cap="none" normalizeH="0" baseline="0">
-                <a:ln>
-                  <a:noFill/>
-                </a:ln>
+              <a:rPr lang="en-US" altLang="en-US" sz="1300">
                 <a:solidFill>
                   <a:srgbClr val="A9B7C6"/>
                 </a:solidFill>
-                <a:effectLst/>
                 <a:latin typeface="Courier New" panose="02070309020205020404" pitchFamily="49" charset="0"/>
                 <a:cs typeface="Courier New" panose="02070309020205020404" pitchFamily="49" charset="0"/>
               </a:rPr>
               <a:t>currentVertex.setKnown(</a:t>
             </a:r>
             <a:r>
-              <a:rPr kumimoji="0" lang="en-US" altLang="en-US" sz="1400" b="0" i="0" u="none" strike="noStrike" cap="none" normalizeH="0" baseline="0">
-                <a:ln>
-                  <a:noFill/>
-                </a:ln>
+              <a:rPr lang="en-US" altLang="en-US" sz="1300">
                 <a:solidFill>
                   <a:srgbClr val="CC7832"/>
                 </a:solidFill>
-                <a:effectLst/>
                 <a:latin typeface="Courier New" panose="02070309020205020404" pitchFamily="49" charset="0"/>
                 <a:cs typeface="Courier New" panose="02070309020205020404" pitchFamily="49" charset="0"/>
               </a:rPr>
               <a:t>true</a:t>
             </a:r>
             <a:r>
-              <a:rPr kumimoji="0" lang="en-US" altLang="en-US" sz="1400" b="0" i="0" u="none" strike="noStrike" cap="none" normalizeH="0" baseline="0">
-                <a:ln>
-                  <a:noFill/>
-                </a:ln>
+              <a:rPr lang="en-US" altLang="en-US" sz="1300">
                 <a:solidFill>
                   <a:srgbClr val="A9B7C6"/>
                 </a:solidFill>
-                <a:effectLst/>
                 <a:latin typeface="Courier New" panose="02070309020205020404" pitchFamily="49" charset="0"/>
                 <a:cs typeface="Courier New" panose="02070309020205020404" pitchFamily="49" charset="0"/>
               </a:rPr>
               <a:t>)</a:t>
             </a:r>
             <a:r>
-              <a:rPr kumimoji="0" lang="en-US" altLang="en-US" sz="1400" b="0" i="0" u="none" strike="noStrike" cap="none" normalizeH="0" baseline="0">
-                <a:ln>
-                  <a:noFill/>
-                </a:ln>
+              <a:rPr lang="en-US" altLang="en-US" sz="1300">
                 <a:solidFill>
                   <a:srgbClr val="CC7832"/>
                 </a:solidFill>
-                <a:effectLst/>
                 <a:latin typeface="Courier New" panose="02070309020205020404" pitchFamily="49" charset="0"/>
                 <a:cs typeface="Courier New" panose="02070309020205020404" pitchFamily="49" charset="0"/>
               </a:rPr>
               <a:t>;</a:t>
             </a:r>
             <a:br>
-              <a:rPr kumimoji="0" lang="en-US" altLang="en-US" sz="1400" b="0" i="0" u="none" strike="noStrike" cap="none" normalizeH="0" baseline="0">
-                <a:ln>
-                  <a:noFill/>
-                </a:ln>
+              <a:rPr lang="en-US" altLang="en-US" sz="1300">
                 <a:solidFill>
                   <a:srgbClr val="CC7832"/>
                 </a:solidFill>
-                <a:effectLst/>
                 <a:latin typeface="Courier New" panose="02070309020205020404" pitchFamily="49" charset="0"/>
                 <a:cs typeface="Courier New" panose="02070309020205020404" pitchFamily="49" charset="0"/>
               </a:rPr>
             </a:br>
             <a:r>
-              <a:rPr kumimoji="0" lang="en-US" altLang="en-US" sz="1400" b="0" i="0" u="none" strike="noStrike" cap="none" normalizeH="0" baseline="0">
-                <a:ln>
-                  <a:noFill/>
-                </a:ln>
+              <a:rPr lang="en-US" altLang="en-US" sz="1300">
                 <a:solidFill>
                   <a:srgbClr val="CC7832"/>
                 </a:solidFill>
-                <a:effectLst/>
                 <a:latin typeface="Courier New" panose="02070309020205020404" pitchFamily="49" charset="0"/>
                 <a:cs typeface="Courier New" panose="02070309020205020404" pitchFamily="49" charset="0"/>
               </a:rPr>
               <a:t>        double </a:t>
             </a:r>
             <a:r>
-              <a:rPr kumimoji="0" lang="en-US" altLang="en-US" sz="1400" b="0" i="0" u="none" strike="noStrike" cap="none" normalizeH="0" baseline="0">
-                <a:ln>
-                  <a:noFill/>
-                </a:ln>
+              <a:rPr lang="en-US" altLang="en-US" sz="1300">
                 <a:solidFill>
                   <a:srgbClr val="A9B7C6"/>
                 </a:solidFill>
-                <a:effectLst/>
                 <a:latin typeface="Courier New" panose="02070309020205020404" pitchFamily="49" charset="0"/>
                 <a:cs typeface="Courier New" panose="02070309020205020404" pitchFamily="49" charset="0"/>
               </a:rPr>
               <a:t>nextPathDistance = Double.</a:t>
             </a:r>
             <a:r>
-              <a:rPr kumimoji="0" lang="en-US" altLang="en-US" sz="1400" b="0" i="1" u="none" strike="noStrike" cap="none" normalizeH="0" baseline="0">
-                <a:ln>
-                  <a:noFill/>
-                </a:ln>
+              <a:rPr lang="en-US" altLang="en-US" sz="1300" i="1">
                 <a:solidFill>
                   <a:srgbClr val="9876AA"/>
                 </a:solidFill>
-                <a:effectLst/>
                 <a:latin typeface="Courier New" panose="02070309020205020404" pitchFamily="49" charset="0"/>
                 <a:cs typeface="Courier New" panose="02070309020205020404" pitchFamily="49" charset="0"/>
               </a:rPr>
               <a:t>MAX_VALUE</a:t>
             </a:r>
             <a:r>
-              <a:rPr kumimoji="0" lang="en-US" altLang="en-US" sz="1400" b="0" i="0" u="none" strike="noStrike" cap="none" normalizeH="0" baseline="0">
-                <a:ln>
-                  <a:noFill/>
-                </a:ln>
+              <a:rPr lang="en-US" altLang="en-US" sz="1300">
                 <a:solidFill>
                   <a:srgbClr val="CC7832"/>
                 </a:solidFill>
-                <a:effectLst/>
                 <a:latin typeface="Courier New" panose="02070309020205020404" pitchFamily="49" charset="0"/>
                 <a:cs typeface="Courier New" panose="02070309020205020404" pitchFamily="49" charset="0"/>
               </a:rPr>
               <a:t>;</a:t>
             </a:r>
             <a:br>
-              <a:rPr kumimoji="0" lang="en-US" altLang="en-US" sz="1400" b="0" i="0" u="none" strike="noStrike" cap="none" normalizeH="0" baseline="0">
-                <a:ln>
-                  <a:noFill/>
-                </a:ln>
+              <a:rPr lang="en-US" altLang="en-US" sz="1300">
                 <a:solidFill>
                   <a:srgbClr val="CC7832"/>
                 </a:solidFill>
-                <a:effectLst/>
                 <a:latin typeface="Courier New" panose="02070309020205020404" pitchFamily="49" charset="0"/>
                 <a:cs typeface="Courier New" panose="02070309020205020404" pitchFamily="49" charset="0"/>
               </a:rPr>
             </a:br>
             <a:r>
-              <a:rPr kumimoji="0" lang="en-US" altLang="en-US" sz="1400" b="0" i="0" u="none" strike="noStrike" cap="none" normalizeH="0" baseline="0">
-                <a:ln>
-                  <a:noFill/>
-                </a:ln>
+              <a:rPr lang="en-US" altLang="en-US" sz="1300">
                 <a:solidFill>
                   <a:srgbClr val="CC7832"/>
                 </a:solidFill>
-                <a:effectLst/>
                 <a:latin typeface="Courier New" panose="02070309020205020404" pitchFamily="49" charset="0"/>
                 <a:cs typeface="Courier New" panose="02070309020205020404" pitchFamily="49" charset="0"/>
               </a:rPr>
               <a:t>        for </a:t>
             </a:r>
             <a:r>
-              <a:rPr kumimoji="0" lang="en-US" altLang="en-US" sz="1400" b="0" i="0" u="none" strike="noStrike" cap="none" normalizeH="0" baseline="0">
-                <a:ln>
-                  <a:noFill/>
-                </a:ln>
+              <a:rPr lang="en-US" altLang="en-US" sz="1300">
                 <a:solidFill>
                   <a:srgbClr val="A9B7C6"/>
                 </a:solidFill>
-                <a:effectLst/>
                 <a:latin typeface="Courier New" panose="02070309020205020404" pitchFamily="49" charset="0"/>
                 <a:cs typeface="Courier New" panose="02070309020205020404" pitchFamily="49" charset="0"/>
               </a:rPr>
               <a:t>(Edge edge : edges) {</a:t>
             </a:r>
             <a:br>
-              <a:rPr kumimoji="0" lang="en-US" altLang="en-US" sz="1400" b="0" i="0" u="none" strike="noStrike" cap="none" normalizeH="0" baseline="0">
-                <a:ln>
-                  <a:noFill/>
-                </a:ln>
+              <a:rPr lang="en-US" altLang="en-US" sz="1300">
                 <a:solidFill>
                   <a:srgbClr val="A9B7C6"/>
                 </a:solidFill>
-                <a:effectLst/>
                 <a:latin typeface="Courier New" panose="02070309020205020404" pitchFamily="49" charset="0"/>
                 <a:cs typeface="Courier New" panose="02070309020205020404" pitchFamily="49" charset="0"/>
               </a:rPr>
             </a:br>
             <a:r>
-              <a:rPr kumimoji="0" lang="en-US" altLang="en-US" sz="1400" b="0" i="0" u="none" strike="noStrike" cap="none" normalizeH="0" baseline="0">
-                <a:ln>
-                  <a:noFill/>
-                </a:ln>
+              <a:rPr lang="en-US" altLang="en-US" sz="1300">
                 <a:solidFill>
                   <a:srgbClr val="A9B7C6"/>
                 </a:solidFill>
-                <a:effectLst/>
                 <a:latin typeface="Courier New" panose="02070309020205020404" pitchFamily="49" charset="0"/>
                 <a:cs typeface="Courier New" panose="02070309020205020404" pitchFamily="49" charset="0"/>
               </a:rPr>
               <a:t>            </a:t>
             </a:r>
             <a:r>
-              <a:rPr kumimoji="0" lang="en-US" altLang="en-US" sz="1400" b="0" i="0" u="none" strike="noStrike" cap="none" normalizeH="0" baseline="0">
-                <a:ln>
-                  <a:noFill/>
-                </a:ln>
+              <a:rPr lang="en-US" altLang="en-US" sz="1300">
                 <a:solidFill>
                   <a:srgbClr val="CC7832"/>
                 </a:solidFill>
-                <a:effectLst/>
                 <a:latin typeface="Courier New" panose="02070309020205020404" pitchFamily="49" charset="0"/>
                 <a:cs typeface="Courier New" panose="02070309020205020404" pitchFamily="49" charset="0"/>
               </a:rPr>
               <a:t>if </a:t>
             </a:r>
             <a:r>
-              <a:rPr kumimoji="0" lang="en-US" altLang="en-US" sz="1400" b="0" i="0" u="none" strike="noStrike" cap="none" normalizeH="0" baseline="0">
-                <a:ln>
-                  <a:noFill/>
-                </a:ln>
+              <a:rPr lang="en-US" altLang="en-US" sz="1300">
                 <a:solidFill>
                   <a:srgbClr val="A9B7C6"/>
                 </a:solidFill>
-                <a:effectLst/>
                 <a:latin typeface="Courier New" panose="02070309020205020404" pitchFamily="49" charset="0"/>
                 <a:cs typeface="Courier New" panose="02070309020205020404" pitchFamily="49" charset="0"/>
               </a:rPr>
-              <a:t>(edge.getSecondVertex().getDistance() &gt; currentVertex.getDistance() + edge.getWeight())</a:t>
+              <a:t>(edge.getSecondVertex().getDistance() &gt; currentVertex.getDistance() + edge.getWeight()) {</a:t>
             </a:r>
             <a:br>
-              <a:rPr kumimoji="0" lang="en-US" altLang="en-US" sz="1400" b="0" i="0" u="none" strike="noStrike" cap="none" normalizeH="0" baseline="0">
-                <a:ln>
-                  <a:noFill/>
-                </a:ln>
+              <a:rPr lang="en-US" altLang="en-US" sz="1300">
                 <a:solidFill>
                   <a:srgbClr val="A9B7C6"/>
                 </a:solidFill>
-                <a:effectLst/>
                 <a:latin typeface="Courier New" panose="02070309020205020404" pitchFamily="49" charset="0"/>
                 <a:cs typeface="Courier New" panose="02070309020205020404" pitchFamily="49" charset="0"/>
               </a:rPr>
             </a:br>
             <a:r>
-              <a:rPr kumimoji="0" lang="en-US" altLang="en-US" sz="1400" b="0" i="0" u="none" strike="noStrike" cap="none" normalizeH="0" baseline="0">
-                <a:ln>
-                  <a:noFill/>
-                </a:ln>
+              <a:rPr lang="en-US" altLang="en-US" sz="1300">
                 <a:solidFill>
                   <a:srgbClr val="A9B7C6"/>
                 </a:solidFill>
-                <a:effectLst/>
                 <a:latin typeface="Courier New" panose="02070309020205020404" pitchFamily="49" charset="0"/>
                 <a:cs typeface="Courier New" panose="02070309020205020404" pitchFamily="49" charset="0"/>
               </a:rPr>
               <a:t>                edge.getSecondVertex().setDistance(currentVertex.getDistance() + edge.getWeight())</a:t>
             </a:r>
             <a:r>
-              <a:rPr kumimoji="0" lang="en-US" altLang="en-US" sz="1400" b="0" i="0" u="none" strike="noStrike" cap="none" normalizeH="0" baseline="0">
-                <a:ln>
-                  <a:noFill/>
-                </a:ln>
+              <a:rPr lang="en-US" altLang="en-US" sz="1300">
                 <a:solidFill>
                   <a:srgbClr val="CC7832"/>
                 </a:solidFill>
-                <a:effectLst/>
                 <a:latin typeface="Courier New" panose="02070309020205020404" pitchFamily="49" charset="0"/>
                 <a:cs typeface="Courier New" panose="02070309020205020404" pitchFamily="49" charset="0"/>
               </a:rPr>
               <a:t>;</a:t>
             </a:r>
             <a:br>
-              <a:rPr kumimoji="0" lang="en-US" altLang="en-US" sz="1400" b="0" i="0" u="none" strike="noStrike" cap="none" normalizeH="0" baseline="0">
-                <a:ln>
-                  <a:noFill/>
-                </a:ln>
+              <a:rPr lang="en-US" altLang="en-US" sz="1300">
                 <a:solidFill>
                   <a:srgbClr val="CC7832"/>
                 </a:solidFill>
-                <a:effectLst/>
                 <a:latin typeface="Courier New" panose="02070309020205020404" pitchFamily="49" charset="0"/>
                 <a:cs typeface="Courier New" panose="02070309020205020404" pitchFamily="49" charset="0"/>
               </a:rPr>
             </a:br>
             <a:r>
-              <a:rPr kumimoji="0" lang="en-US" altLang="en-US" sz="1400" b="0" i="0" u="none" strike="noStrike" cap="none" normalizeH="0" baseline="0">
-                <a:ln>
-                  <a:noFill/>
-                </a:ln>
+              <a:rPr lang="en-US" altLang="en-US" sz="1300">
                 <a:solidFill>
                   <a:srgbClr val="CC7832"/>
                 </a:solidFill>
-                <a:effectLst/>
                 <a:latin typeface="Courier New" panose="02070309020205020404" pitchFamily="49" charset="0"/>
                 <a:cs typeface="Courier New" panose="02070309020205020404" pitchFamily="49" charset="0"/>
               </a:rPr>
-              <a:t>            if </a:t>
-            </a:r>
-            <a:r>
-              <a:rPr kumimoji="0" lang="en-US" altLang="en-US" sz="1400" b="0" i="0" u="none" strike="noStrike" cap="none" normalizeH="0" baseline="0">
-                <a:ln>
-                  <a:noFill/>
-                </a:ln>
+              <a:t>                </a:t>
+            </a:r>
+            <a:r>
+              <a:rPr lang="en-US" altLang="en-US" sz="1300">
                 <a:solidFill>
                   <a:srgbClr val="A9B7C6"/>
                 </a:solidFill>
-                <a:effectLst/>
+                <a:latin typeface="Courier New" panose="02070309020205020404" pitchFamily="49" charset="0"/>
+                <a:cs typeface="Courier New" panose="02070309020205020404" pitchFamily="49" charset="0"/>
+              </a:rPr>
+              <a:t>edge.getSecondVertex().setPreviousVertexValue(currentVertex.getValue())</a:t>
+            </a:r>
+            <a:r>
+              <a:rPr lang="en-US" altLang="en-US" sz="1300">
+                <a:solidFill>
+                  <a:srgbClr val="CC7832"/>
+                </a:solidFill>
+                <a:latin typeface="Courier New" panose="02070309020205020404" pitchFamily="49" charset="0"/>
+                <a:cs typeface="Courier New" panose="02070309020205020404" pitchFamily="49" charset="0"/>
+              </a:rPr>
+              <a:t>;</a:t>
+            </a:r>
+            <a:br>
+              <a:rPr lang="en-US" altLang="en-US" sz="1300">
+                <a:solidFill>
+                  <a:srgbClr val="CC7832"/>
+                </a:solidFill>
+                <a:latin typeface="Courier New" panose="02070309020205020404" pitchFamily="49" charset="0"/>
+                <a:cs typeface="Courier New" panose="02070309020205020404" pitchFamily="49" charset="0"/>
+              </a:rPr>
+            </a:br>
+            <a:r>
+              <a:rPr lang="en-US" altLang="en-US" sz="1300">
+                <a:solidFill>
+                  <a:srgbClr val="CC7832"/>
+                </a:solidFill>
+                <a:latin typeface="Courier New" panose="02070309020205020404" pitchFamily="49" charset="0"/>
+                <a:cs typeface="Courier New" panose="02070309020205020404" pitchFamily="49" charset="0"/>
+              </a:rPr>
+              <a:t>            </a:t>
+            </a:r>
+            <a:r>
+              <a:rPr lang="en-US" altLang="en-US" sz="1300">
+                <a:solidFill>
+                  <a:srgbClr val="A9B7C6"/>
+                </a:solidFill>
+                <a:latin typeface="Courier New" panose="02070309020205020404" pitchFamily="49" charset="0"/>
+                <a:cs typeface="Courier New" panose="02070309020205020404" pitchFamily="49" charset="0"/>
+              </a:rPr>
+              <a:t>}</a:t>
+            </a:r>
+            <a:br>
+              <a:rPr lang="en-US" altLang="en-US" sz="1300">
+                <a:solidFill>
+                  <a:srgbClr val="A9B7C6"/>
+                </a:solidFill>
+                <a:latin typeface="Courier New" panose="02070309020205020404" pitchFamily="49" charset="0"/>
+                <a:cs typeface="Courier New" panose="02070309020205020404" pitchFamily="49" charset="0"/>
+              </a:rPr>
+            </a:br>
+            <a:r>
+              <a:rPr lang="en-US" altLang="en-US" sz="1300">
+                <a:solidFill>
+                  <a:srgbClr val="A9B7C6"/>
+                </a:solidFill>
+                <a:latin typeface="Courier New" panose="02070309020205020404" pitchFamily="49" charset="0"/>
+                <a:cs typeface="Courier New" panose="02070309020205020404" pitchFamily="49" charset="0"/>
+              </a:rPr>
+              <a:t>            </a:t>
+            </a:r>
+            <a:r>
+              <a:rPr lang="en-US" altLang="en-US" sz="1300">
+                <a:solidFill>
+                  <a:srgbClr val="CC7832"/>
+                </a:solidFill>
+                <a:latin typeface="Courier New" panose="02070309020205020404" pitchFamily="49" charset="0"/>
+                <a:cs typeface="Courier New" panose="02070309020205020404" pitchFamily="49" charset="0"/>
+              </a:rPr>
+              <a:t>if </a:t>
+            </a:r>
+            <a:r>
+              <a:rPr lang="en-US" altLang="en-US" sz="1300">
+                <a:solidFill>
+                  <a:srgbClr val="A9B7C6"/>
+                </a:solidFill>
                 <a:latin typeface="Courier New" panose="02070309020205020404" pitchFamily="49" charset="0"/>
                 <a:cs typeface="Courier New" panose="02070309020205020404" pitchFamily="49" charset="0"/>
               </a:rPr>
               <a:t>(edge.getWeight() &lt; nextPathDistance) {</a:t>
             </a:r>
             <a:br>
-              <a:rPr kumimoji="0" lang="en-US" altLang="en-US" sz="1400" b="0" i="0" u="none" strike="noStrike" cap="none" normalizeH="0" baseline="0">
-                <a:ln>
-                  <a:noFill/>
-                </a:ln>
+              <a:rPr lang="en-US" altLang="en-US" sz="1300">
                 <a:solidFill>
                   <a:srgbClr val="A9B7C6"/>
                 </a:solidFill>
-                <a:effectLst/>
                 <a:latin typeface="Courier New" panose="02070309020205020404" pitchFamily="49" charset="0"/>
                 <a:cs typeface="Courier New" panose="02070309020205020404" pitchFamily="49" charset="0"/>
               </a:rPr>
             </a:br>
             <a:r>
-              <a:rPr kumimoji="0" lang="en-US" altLang="en-US" sz="1400" b="0" i="0" u="none" strike="noStrike" cap="none" normalizeH="0" baseline="0">
-                <a:ln>
-                  <a:noFill/>
-                </a:ln>
+              <a:rPr lang="en-US" altLang="en-US" sz="1300">
                 <a:solidFill>
                   <a:srgbClr val="A9B7C6"/>
                 </a:solidFill>
-                <a:effectLst/>
                 <a:latin typeface="Courier New" panose="02070309020205020404" pitchFamily="49" charset="0"/>
                 <a:cs typeface="Courier New" panose="02070309020205020404" pitchFamily="49" charset="0"/>
               </a:rPr>
               <a:t>                nextPathDistance = edge.getWeight()</a:t>
             </a:r>
             <a:r>
-              <a:rPr kumimoji="0" lang="en-US" altLang="en-US" sz="1400" b="0" i="0" u="none" strike="noStrike" cap="none" normalizeH="0" baseline="0">
-                <a:ln>
-                  <a:noFill/>
-                </a:ln>
+              <a:rPr lang="en-US" altLang="en-US" sz="1300">
                 <a:solidFill>
                   <a:srgbClr val="CC7832"/>
                 </a:solidFill>
-                <a:effectLst/>
                 <a:latin typeface="Courier New" panose="02070309020205020404" pitchFamily="49" charset="0"/>
                 <a:cs typeface="Courier New" panose="02070309020205020404" pitchFamily="49" charset="0"/>
               </a:rPr>
               <a:t>;</a:t>
             </a:r>
             <a:br>
-              <a:rPr kumimoji="0" lang="en-US" altLang="en-US" sz="1400" b="0" i="0" u="none" strike="noStrike" cap="none" normalizeH="0" baseline="0">
-                <a:ln>
-                  <a:noFill/>
-                </a:ln>
+              <a:rPr lang="en-US" altLang="en-US" sz="1300">
                 <a:solidFill>
                   <a:srgbClr val="CC7832"/>
                 </a:solidFill>
-                <a:effectLst/>
                 <a:latin typeface="Courier New" panose="02070309020205020404" pitchFamily="49" charset="0"/>
                 <a:cs typeface="Courier New" panose="02070309020205020404" pitchFamily="49" charset="0"/>
               </a:rPr>
             </a:br>
             <a:r>
-              <a:rPr kumimoji="0" lang="en-US" altLang="en-US" sz="1400" b="0" i="0" u="none" strike="noStrike" cap="none" normalizeH="0" baseline="0">
-                <a:ln>
-                  <a:noFill/>
-                </a:ln>
+              <a:rPr lang="en-US" altLang="en-US" sz="1300">
                 <a:solidFill>
                   <a:srgbClr val="CC7832"/>
                 </a:solidFill>
-                <a:effectLst/>
                 <a:latin typeface="Courier New" panose="02070309020205020404" pitchFamily="49" charset="0"/>
                 <a:cs typeface="Courier New" panose="02070309020205020404" pitchFamily="49" charset="0"/>
               </a:rPr>
               <a:t>            </a:t>
             </a:r>
             <a:r>
-              <a:rPr kumimoji="0" lang="en-US" altLang="en-US" sz="1400" b="0" i="0" u="none" strike="noStrike" cap="none" normalizeH="0" baseline="0">
-                <a:ln>
-                  <a:noFill/>
-                </a:ln>
+              <a:rPr lang="en-US" altLang="en-US" sz="1300">
                 <a:solidFill>
                   <a:srgbClr val="A9B7C6"/>
                 </a:solidFill>
-                <a:effectLst/>
                 <a:latin typeface="Courier New" panose="02070309020205020404" pitchFamily="49" charset="0"/>
                 <a:cs typeface="Courier New" panose="02070309020205020404" pitchFamily="49" charset="0"/>
               </a:rPr>
               <a:t>}</a:t>
             </a:r>
             <a:br>
-              <a:rPr kumimoji="0" lang="en-US" altLang="en-US" sz="1400" b="0" i="0" u="none" strike="noStrike" cap="none" normalizeH="0" baseline="0">
-                <a:ln>
-                  <a:noFill/>
-                </a:ln>
+              <a:rPr lang="en-US" altLang="en-US" sz="1300">
                 <a:solidFill>
                   <a:srgbClr val="A9B7C6"/>
                 </a:solidFill>
-                <a:effectLst/>
                 <a:latin typeface="Courier New" panose="02070309020205020404" pitchFamily="49" charset="0"/>
                 <a:cs typeface="Courier New" panose="02070309020205020404" pitchFamily="49" charset="0"/>
               </a:rPr>
             </a:br>
             <a:r>
-              <a:rPr kumimoji="0" lang="en-US" altLang="en-US" sz="1400" b="0" i="0" u="none" strike="noStrike" cap="none" normalizeH="0" baseline="0">
-                <a:ln>
-                  <a:noFill/>
-                </a:ln>
+              <a:rPr lang="en-US" altLang="en-US" sz="1300">
                 <a:solidFill>
                   <a:srgbClr val="A9B7C6"/>
                 </a:solidFill>
-                <a:effectLst/>
                 <a:latin typeface="Courier New" panose="02070309020205020404" pitchFamily="49" charset="0"/>
                 <a:cs typeface="Courier New" panose="02070309020205020404" pitchFamily="49" charset="0"/>
               </a:rPr>
               <a:t>        }</a:t>
             </a:r>
             <a:br>
-              <a:rPr kumimoji="0" lang="en-US" altLang="en-US" sz="1400" b="0" i="0" u="none" strike="noStrike" cap="none" normalizeH="0" baseline="0">
-                <a:ln>
-                  <a:noFill/>
-                </a:ln>
+              <a:rPr lang="en-US" altLang="en-US" sz="1300">
                 <a:solidFill>
                   <a:srgbClr val="A9B7C6"/>
                 </a:solidFill>
-                <a:effectLst/>
                 <a:latin typeface="Courier New" panose="02070309020205020404" pitchFamily="49" charset="0"/>
                 <a:cs typeface="Courier New" panose="02070309020205020404" pitchFamily="49" charset="0"/>
               </a:rPr>
             </a:br>
             <a:r>
-              <a:rPr kumimoji="0" lang="en-US" altLang="en-US" sz="1400" b="0" i="0" u="none" strike="noStrike" cap="none" normalizeH="0" baseline="0">
-                <a:ln>
-                  <a:noFill/>
-                </a:ln>
+              <a:rPr lang="en-US" altLang="en-US" sz="1300">
                 <a:solidFill>
                   <a:srgbClr val="A9B7C6"/>
                 </a:solidFill>
-                <a:effectLst/>
                 <a:latin typeface="Courier New" panose="02070309020205020404" pitchFamily="49" charset="0"/>
                 <a:cs typeface="Courier New" panose="02070309020205020404" pitchFamily="49" charset="0"/>
               </a:rPr>
               <a:t>        currentVertex = getSecondVertex(currentVertex</a:t>
             </a:r>
             <a:r>
-              <a:rPr kumimoji="0" lang="en-US" altLang="en-US" sz="1400" b="0" i="0" u="none" strike="noStrike" cap="none" normalizeH="0" baseline="0">
-                <a:ln>
-                  <a:noFill/>
-                </a:ln>
+              <a:rPr lang="en-US" altLang="en-US" sz="1300">
                 <a:solidFill>
                   <a:srgbClr val="CC7832"/>
                 </a:solidFill>
-                <a:effectLst/>
                 <a:latin typeface="Courier New" panose="02070309020205020404" pitchFamily="49" charset="0"/>
                 <a:cs typeface="Courier New" panose="02070309020205020404" pitchFamily="49" charset="0"/>
               </a:rPr>
               <a:t>, </a:t>
             </a:r>
             <a:r>
-              <a:rPr kumimoji="0" lang="en-US" altLang="en-US" sz="1400" b="0" i="0" u="none" strike="noStrike" cap="none" normalizeH="0" baseline="0">
-                <a:ln>
-                  <a:noFill/>
-                </a:ln>
+              <a:rPr lang="en-US" altLang="en-US" sz="1300">
                 <a:solidFill>
                   <a:srgbClr val="A9B7C6"/>
                 </a:solidFill>
-                <a:effectLst/>
                 <a:latin typeface="Courier New" panose="02070309020205020404" pitchFamily="49" charset="0"/>
                 <a:cs typeface="Courier New" panose="02070309020205020404" pitchFamily="49" charset="0"/>
               </a:rPr>
               <a:t>nextPathDistance)</a:t>
             </a:r>
             <a:r>
-              <a:rPr kumimoji="0" lang="en-US" altLang="en-US" sz="1400" b="0" i="0" u="none" strike="noStrike" cap="none" normalizeH="0" baseline="0">
-                <a:ln>
-                  <a:noFill/>
-                </a:ln>
+              <a:rPr lang="en-US" altLang="en-US" sz="1300">
                 <a:solidFill>
                   <a:srgbClr val="CC7832"/>
                 </a:solidFill>
-                <a:effectLst/>
                 <a:latin typeface="Courier New" panose="02070309020205020404" pitchFamily="49" charset="0"/>
                 <a:cs typeface="Courier New" panose="02070309020205020404" pitchFamily="49" charset="0"/>
               </a:rPr>
               <a:t>;</a:t>
             </a:r>
             <a:br>
-              <a:rPr kumimoji="0" lang="en-US" altLang="en-US" sz="1400" b="0" i="0" u="none" strike="noStrike" cap="none" normalizeH="0" baseline="0">
-                <a:ln>
-                  <a:noFill/>
-                </a:ln>
+              <a:rPr lang="en-US" altLang="en-US" sz="1300">
                 <a:solidFill>
                   <a:srgbClr val="CC7832"/>
                 </a:solidFill>
-                <a:effectLst/>
                 <a:latin typeface="Courier New" panose="02070309020205020404" pitchFamily="49" charset="0"/>
                 <a:cs typeface="Courier New" panose="02070309020205020404" pitchFamily="49" charset="0"/>
               </a:rPr>
             </a:br>
             <a:r>
-              <a:rPr kumimoji="0" lang="en-US" altLang="en-US" sz="1400" b="0" i="0" u="none" strike="noStrike" cap="none" normalizeH="0" baseline="0">
-                <a:ln>
-                  <a:noFill/>
-                </a:ln>
+              <a:rPr lang="en-US" altLang="en-US" sz="1300">
                 <a:solidFill>
                   <a:srgbClr val="CC7832"/>
                 </a:solidFill>
-                <a:effectLst/>
                 <a:latin typeface="Courier New" panose="02070309020205020404" pitchFamily="49" charset="0"/>
                 <a:cs typeface="Courier New" panose="02070309020205020404" pitchFamily="49" charset="0"/>
               </a:rPr>
               <a:t>    </a:t>
             </a:r>
             <a:r>
-              <a:rPr kumimoji="0" lang="en-US" altLang="en-US" sz="1400" b="0" i="0" u="none" strike="noStrike" cap="none" normalizeH="0" baseline="0">
-                <a:ln>
-                  <a:noFill/>
-                </a:ln>
+              <a:rPr lang="en-US" altLang="en-US" sz="1300">
                 <a:solidFill>
                   <a:srgbClr val="A9B7C6"/>
                 </a:solidFill>
-                <a:effectLst/>
                 <a:latin typeface="Courier New" panose="02070309020205020404" pitchFamily="49" charset="0"/>
                 <a:cs typeface="Courier New" panose="02070309020205020404" pitchFamily="49" charset="0"/>
               </a:rPr>
               <a:t>}</a:t>
             </a:r>
             <a:br>
-              <a:rPr kumimoji="0" lang="en-US" altLang="en-US" sz="1400" b="0" i="0" u="none" strike="noStrike" cap="none" normalizeH="0" baseline="0">
-                <a:ln>
-                  <a:noFill/>
-                </a:ln>
+              <a:rPr lang="en-US" altLang="en-US" sz="1300">
                 <a:solidFill>
                   <a:srgbClr val="A9B7C6"/>
                 </a:solidFill>
-                <a:effectLst/>
                 <a:latin typeface="Courier New" panose="02070309020205020404" pitchFamily="49" charset="0"/>
                 <a:cs typeface="Courier New" panose="02070309020205020404" pitchFamily="49" charset="0"/>
               </a:rPr>
             </a:br>
             <a:r>
-              <a:rPr kumimoji="0" lang="en-US" altLang="en-US" sz="1400" b="0" i="0" u="none" strike="noStrike" cap="none" normalizeH="0" baseline="0">
-                <a:ln>
-                  <a:noFill/>
-                </a:ln>
+              <a:rPr lang="en-US" altLang="en-US" sz="1300">
                 <a:solidFill>
                   <a:srgbClr val="A9B7C6"/>
                 </a:solidFill>
-                <a:effectLst/>
                 <a:latin typeface="Courier New" panose="02070309020205020404" pitchFamily="49" charset="0"/>
                 <a:cs typeface="Courier New" panose="02070309020205020404" pitchFamily="49" charset="0"/>
               </a:rPr>
-              <a:t>    </a:t>
-            </a:r>
-            <a:r>
-              <a:rPr kumimoji="0" lang="en-US" altLang="en-US" sz="1400" b="0" i="0" u="none" strike="noStrike" cap="none" normalizeH="0" baseline="0">
-                <a:ln>
-                  <a:noFill/>
-                </a:ln>
-                <a:solidFill>
-                  <a:srgbClr val="CC7832"/>
-                </a:solidFill>
-                <a:effectLst/>
-                <a:latin typeface="Courier New" panose="02070309020205020404" pitchFamily="49" charset="0"/>
-                <a:cs typeface="Courier New" panose="02070309020205020404" pitchFamily="49" charset="0"/>
-              </a:rPr>
-              <a:t>return </a:t>
-            </a:r>
-            <a:r>
-              <a:rPr kumimoji="0" lang="en-US" altLang="en-US" sz="1400" b="0" i="0" u="none" strike="noStrike" cap="none" normalizeH="0" baseline="0">
-                <a:ln>
-                  <a:noFill/>
-                </a:ln>
+              <a:t>}</a:t>
+            </a:r>
+            <a:br>
+              <a:rPr lang="en-US" altLang="en-US" sz="1300">
                 <a:solidFill>
                   <a:srgbClr val="A9B7C6"/>
                 </a:solidFill>
-                <a:effectLst/>
-                <a:latin typeface="Courier New" panose="02070309020205020404" pitchFamily="49" charset="0"/>
-                <a:cs typeface="Courier New" panose="02070309020205020404" pitchFamily="49" charset="0"/>
-              </a:rPr>
-              <a:t>getVertex(secondValue).getDistance()</a:t>
-            </a:r>
-            <a:r>
-              <a:rPr kumimoji="0" lang="en-US" altLang="en-US" sz="1400" b="0" i="0" u="none" strike="noStrike" cap="none" normalizeH="0" baseline="0">
-                <a:ln>
-                  <a:noFill/>
-                </a:ln>
-                <a:solidFill>
-                  <a:srgbClr val="CC7832"/>
-                </a:solidFill>
-                <a:effectLst/>
-                <a:latin typeface="Courier New" panose="02070309020205020404" pitchFamily="49" charset="0"/>
-                <a:cs typeface="Courier New" panose="02070309020205020404" pitchFamily="49" charset="0"/>
-              </a:rPr>
-              <a:t>;</a:t>
-            </a:r>
-            <a:br>
-              <a:rPr kumimoji="0" lang="en-US" altLang="en-US" sz="1400" b="0" i="0" u="none" strike="noStrike" cap="none" normalizeH="0" baseline="0">
-                <a:ln>
-                  <a:noFill/>
-                </a:ln>
-                <a:solidFill>
-                  <a:srgbClr val="CC7832"/>
-                </a:solidFill>
-                <a:effectLst/>
                 <a:latin typeface="Courier New" panose="02070309020205020404" pitchFamily="49" charset="0"/>
                 <a:cs typeface="Courier New" panose="02070309020205020404" pitchFamily="49" charset="0"/>
               </a:rPr>
             </a:br>
-            <a:r>
-              <a:rPr kumimoji="0" lang="en-US" altLang="en-US" sz="1400" b="0" i="0" u="none" strike="noStrike" cap="none" normalizeH="0" baseline="0">
-                <a:ln>
-                  <a:noFill/>
-                </a:ln>
-                <a:solidFill>
-                  <a:srgbClr val="A9B7C6"/>
-                </a:solidFill>
-                <a:effectLst/>
-                <a:latin typeface="Courier New" panose="02070309020205020404" pitchFamily="49" charset="0"/>
-                <a:cs typeface="Courier New" panose="02070309020205020404" pitchFamily="49" charset="0"/>
-              </a:rPr>
-              <a:t>}</a:t>
-            </a:r>
-            <a:endParaRPr kumimoji="0" lang="en-US" altLang="en-US" sz="1800" b="0" i="0" u="none" strike="noStrike" cap="none" normalizeH="0" baseline="0">
-              <a:ln>
-                <a:noFill/>
-              </a:ln>
+            <a:endParaRPr lang="en-US" altLang="en-US">
               <a:solidFill>
                 <a:schemeClr val="tx1"/>
               </a:solidFill>
-              <a:effectLst/>
               <a:latin typeface="Arial" panose="020B0604020202020204" pitchFamily="34" charset="0"/>
             </a:endParaRPr>
           </a:p>
@@ -10286,10 +11084,137 @@
       </p:grpSpPr>
       <p:sp>
         <p:nvSpPr>
+          <p:cNvPr id="2" name="Title 1">
+            <a:extLst>
+              <a:ext uri="{FF2B5EF4-FFF2-40B4-BE49-F238E27FC236}">
+                <a16:creationId xmlns:a16="http://schemas.microsoft.com/office/drawing/2014/main" id="{289BE3C2-F84E-42AD-8B7B-CFDB7022F56A}"/>
+              </a:ext>
+            </a:extLst>
+          </p:cNvPr>
+          <p:cNvSpPr>
+            <a:spLocks noGrp="1"/>
+          </p:cNvSpPr>
+          <p:nvPr>
+            <p:ph type="title"/>
+          </p:nvPr>
+        </p:nvSpPr>
+        <p:spPr>
+          <a:xfrm>
+            <a:off x="2592925" y="624110"/>
+            <a:ext cx="8911687" cy="852998"/>
+          </a:xfrm>
+        </p:spPr>
+        <p:txBody>
+          <a:bodyPr/>
+          <a:lstStyle/>
+          <a:p>
+            <a:r>
+              <a:rPr lang="en-US" dirty="0"/>
+              <a:t>Output</a:t>
+            </a:r>
+          </a:p>
+        </p:txBody>
+      </p:sp>
+      <p:sp>
+        <p:nvSpPr>
+          <p:cNvPr id="4" name="Slide Number Placeholder 3">
+            <a:extLst>
+              <a:ext uri="{FF2B5EF4-FFF2-40B4-BE49-F238E27FC236}">
+                <a16:creationId xmlns:a16="http://schemas.microsoft.com/office/drawing/2014/main" id="{1E83094B-F79B-45BE-A365-61F177C35508}"/>
+              </a:ext>
+            </a:extLst>
+          </p:cNvPr>
+          <p:cNvSpPr>
+            <a:spLocks noGrp="1"/>
+          </p:cNvSpPr>
+          <p:nvPr>
+            <p:ph type="sldNum" sz="quarter" idx="12"/>
+          </p:nvPr>
+        </p:nvSpPr>
+        <p:spPr/>
+        <p:txBody>
+          <a:bodyPr/>
+          <a:lstStyle/>
+          <a:p>
+            <a:fld id="{2B25DBF2-E2F2-498E-8F35-AC746470812A}" type="slidenum">
+              <a:rPr lang="en-US" smtClean="0"/>
+              <a:t>25</a:t>
+            </a:fld>
+            <a:endParaRPr lang="en-US"/>
+          </a:p>
+        </p:txBody>
+      </p:sp>
+      <p:pic>
+        <p:nvPicPr>
+          <p:cNvPr id="8" name="Content Placeholder 9" descr="Text&#10;&#10;Description automatically generated">
+            <a:extLst>
+              <a:ext uri="{FF2B5EF4-FFF2-40B4-BE49-F238E27FC236}">
+                <a16:creationId xmlns:a16="http://schemas.microsoft.com/office/drawing/2014/main" id="{01F71052-CFE4-4380-8927-13A98D251598}"/>
+              </a:ext>
+            </a:extLst>
+          </p:cNvPr>
+          <p:cNvPicPr>
+            <a:picLocks noGrp="1" noChangeAspect="1"/>
+          </p:cNvPicPr>
+          <p:nvPr>
+            <p:ph idx="1"/>
+          </p:nvPr>
+        </p:nvPicPr>
+        <p:blipFill>
+          <a:blip r:embed="rId2">
+            <a:extLst>
+              <a:ext uri="{28A0092B-C50C-407E-A947-70E740481C1C}">
+                <a14:useLocalDpi xmlns:a14="http://schemas.microsoft.com/office/drawing/2010/main" val="0"/>
+              </a:ext>
+            </a:extLst>
+          </a:blip>
+          <a:stretch>
+            <a:fillRect/>
+          </a:stretch>
+        </p:blipFill>
+        <p:spPr>
+          <a:xfrm>
+            <a:off x="2592925" y="1800665"/>
+            <a:ext cx="7160978" cy="3720416"/>
+          </a:xfrm>
+        </p:spPr>
+      </p:pic>
+    </p:spTree>
+    <p:extLst>
+      <p:ext uri="{BB962C8B-B14F-4D97-AF65-F5344CB8AC3E}">
+        <p14:creationId xmlns:p14="http://schemas.microsoft.com/office/powerpoint/2010/main" val="57287682"/>
+      </p:ext>
+    </p:extLst>
+  </p:cSld>
+  <p:clrMapOvr>
+    <a:masterClrMapping/>
+  </p:clrMapOvr>
+</p:sld>
+</file>
+
+<file path=ppt/slides/slide26.xml><?xml version="1.0" encoding="utf-8"?>
+<p:sld xmlns:a="http://schemas.openxmlformats.org/drawingml/2006/main" xmlns:r="http://schemas.openxmlformats.org/officeDocument/2006/relationships" xmlns:p="http://schemas.openxmlformats.org/presentationml/2006/main">
+  <p:cSld>
+    <p:spTree>
+      <p:nvGrpSpPr>
+        <p:cNvPr id="1" name=""/>
+        <p:cNvGrpSpPr/>
+        <p:nvPr/>
+      </p:nvGrpSpPr>
+      <p:grpSpPr>
+        <a:xfrm>
+          <a:off x="0" y="0"/>
+          <a:ext cx="0" cy="0"/>
+          <a:chOff x="0" y="0"/>
+          <a:chExt cx="0" cy="0"/>
+        </a:xfrm>
+      </p:grpSpPr>
+      <p:sp>
+        <p:nvSpPr>
           <p:cNvPr id="3" name="Content Placeholder 2">
             <a:extLst>
               <a:ext uri="{FF2B5EF4-FFF2-40B4-BE49-F238E27FC236}">
-                <a16:creationId xmlns:a16="http://schemas.microsoft.com/office/drawing/2014/main" xmlns="" id="{43004D77-79E2-4727-9BF4-2E557C51CAEF}"/>
+                <a16:creationId xmlns:a16="http://schemas.microsoft.com/office/drawing/2014/main" id="{43004D77-79E2-4727-9BF4-2E557C51CAEF}"/>
               </a:ext>
             </a:extLst>
           </p:cNvPr>
@@ -10331,6 +11256,35 @@
               <a:t>THANK YOU</a:t>
             </a:r>
             <a:endParaRPr lang="en-US" dirty="0"/>
+          </a:p>
+        </p:txBody>
+      </p:sp>
+      <p:sp>
+        <p:nvSpPr>
+          <p:cNvPr id="2" name="Slide Number Placeholder 1">
+            <a:extLst>
+              <a:ext uri="{FF2B5EF4-FFF2-40B4-BE49-F238E27FC236}">
+                <a16:creationId xmlns:a16="http://schemas.microsoft.com/office/drawing/2014/main" id="{4D92054D-76AE-4931-82F1-7997ECA476A0}"/>
+              </a:ext>
+            </a:extLst>
+          </p:cNvPr>
+          <p:cNvSpPr>
+            <a:spLocks noGrp="1"/>
+          </p:cNvSpPr>
+          <p:nvPr>
+            <p:ph type="sldNum" sz="quarter" idx="12"/>
+          </p:nvPr>
+        </p:nvSpPr>
+        <p:spPr/>
+        <p:txBody>
+          <a:bodyPr/>
+          <a:lstStyle/>
+          <a:p>
+            <a:fld id="{2B25DBF2-E2F2-498E-8F35-AC746470812A}" type="slidenum">
+              <a:rPr lang="en-US" smtClean="0"/>
+              <a:t>26</a:t>
+            </a:fld>
+            <a:endParaRPr lang="en-US"/>
           </a:p>
         </p:txBody>
       </p:sp>
@@ -10369,7 +11323,7 @@
           <p:cNvPr id="2" name="Title 1">
             <a:extLst>
               <a:ext uri="{FF2B5EF4-FFF2-40B4-BE49-F238E27FC236}">
-                <a16:creationId xmlns:a16="http://schemas.microsoft.com/office/drawing/2014/main" xmlns="" id="{6B9EE3F0-0FBE-4456-9482-2EE100F4B3C0}"/>
+                <a16:creationId xmlns:a16="http://schemas.microsoft.com/office/drawing/2014/main" id="{6B9EE3F0-0FBE-4456-9482-2EE100F4B3C0}"/>
               </a:ext>
             </a:extLst>
           </p:cNvPr>
@@ -10402,7 +11356,7 @@
           <p:cNvPr id="3" name="Content Placeholder 2">
             <a:extLst>
               <a:ext uri="{FF2B5EF4-FFF2-40B4-BE49-F238E27FC236}">
-                <a16:creationId xmlns:a16="http://schemas.microsoft.com/office/drawing/2014/main" xmlns="" id="{9DBA4EAD-CFA2-4466-A4DB-753C077E1CF9}"/>
+                <a16:creationId xmlns:a16="http://schemas.microsoft.com/office/drawing/2014/main" id="{9DBA4EAD-CFA2-4466-A4DB-753C077E1CF9}"/>
               </a:ext>
             </a:extLst>
           </p:cNvPr>
@@ -10507,6 +11461,35 @@
           <a:p>
             <a:pPr lvl="1"/>
             <a:endParaRPr lang="en-US" dirty="0"/>
+          </a:p>
+        </p:txBody>
+      </p:sp>
+      <p:sp>
+        <p:nvSpPr>
+          <p:cNvPr id="4" name="Slide Number Placeholder 3">
+            <a:extLst>
+              <a:ext uri="{FF2B5EF4-FFF2-40B4-BE49-F238E27FC236}">
+                <a16:creationId xmlns:a16="http://schemas.microsoft.com/office/drawing/2014/main" id="{BE411AE0-8F5E-49A0-8307-E2F2E7233BB6}"/>
+              </a:ext>
+            </a:extLst>
+          </p:cNvPr>
+          <p:cNvSpPr>
+            <a:spLocks noGrp="1"/>
+          </p:cNvSpPr>
+          <p:nvPr>
+            <p:ph type="sldNum" sz="quarter" idx="12"/>
+          </p:nvPr>
+        </p:nvSpPr>
+        <p:spPr/>
+        <p:txBody>
+          <a:bodyPr/>
+          <a:lstStyle/>
+          <a:p>
+            <a:fld id="{2B25DBF2-E2F2-498E-8F35-AC746470812A}" type="slidenum">
+              <a:rPr lang="en-US" smtClean="0"/>
+              <a:t>3</a:t>
+            </a:fld>
+            <a:endParaRPr lang="en-US"/>
           </a:p>
         </p:txBody>
       </p:sp>
@@ -10520,13 +11503,6 @@
   <p:clrMapOvr>
     <a:masterClrMapping/>
   </p:clrMapOvr>
-  <p:timing>
-    <p:tnLst>
-      <p:par>
-        <p:cTn id="1" dur="indefinite" restart="never" nodeType="tmRoot"/>
-      </p:par>
-    </p:tnLst>
-  </p:timing>
 </p:sld>
 </file>
 
@@ -10576,6 +11552,35 @@
           </a:xfrm>
         </p:spPr>
       </p:pic>
+      <p:sp>
+        <p:nvSpPr>
+          <p:cNvPr id="2" name="Slide Number Placeholder 1">
+            <a:extLst>
+              <a:ext uri="{FF2B5EF4-FFF2-40B4-BE49-F238E27FC236}">
+                <a16:creationId xmlns:a16="http://schemas.microsoft.com/office/drawing/2014/main" id="{582DA7D1-BFD8-4A9B-B8DE-359641C607D8}"/>
+              </a:ext>
+            </a:extLst>
+          </p:cNvPr>
+          <p:cNvSpPr>
+            <a:spLocks noGrp="1"/>
+          </p:cNvSpPr>
+          <p:nvPr>
+            <p:ph type="sldNum" sz="quarter" idx="12"/>
+          </p:nvPr>
+        </p:nvSpPr>
+        <p:spPr/>
+        <p:txBody>
+          <a:bodyPr/>
+          <a:lstStyle/>
+          <a:p>
+            <a:fld id="{2B25DBF2-E2F2-498E-8F35-AC746470812A}" type="slidenum">
+              <a:rPr lang="en-US" smtClean="0"/>
+              <a:t>4</a:t>
+            </a:fld>
+            <a:endParaRPr lang="en-US"/>
+          </a:p>
+        </p:txBody>
+      </p:sp>
     </p:spTree>
     <p:extLst>
       <p:ext uri="{BB962C8B-B14F-4D97-AF65-F5344CB8AC3E}">
@@ -10586,13 +11591,6 @@
   <p:clrMapOvr>
     <a:masterClrMapping/>
   </p:clrMapOvr>
-  <p:timing>
-    <p:tnLst>
-      <p:par>
-        <p:cTn id="1" dur="indefinite" restart="never" nodeType="tmRoot"/>
-      </p:par>
-    </p:tnLst>
-  </p:timing>
 </p:sld>
 </file>
 
@@ -10642,6 +11640,35 @@
           </a:xfrm>
         </p:spPr>
       </p:pic>
+      <p:sp>
+        <p:nvSpPr>
+          <p:cNvPr id="2" name="Slide Number Placeholder 1">
+            <a:extLst>
+              <a:ext uri="{FF2B5EF4-FFF2-40B4-BE49-F238E27FC236}">
+                <a16:creationId xmlns:a16="http://schemas.microsoft.com/office/drawing/2014/main" id="{6882FFB2-31C1-4B4D-9AC0-747660C23F92}"/>
+              </a:ext>
+            </a:extLst>
+          </p:cNvPr>
+          <p:cNvSpPr>
+            <a:spLocks noGrp="1"/>
+          </p:cNvSpPr>
+          <p:nvPr>
+            <p:ph type="sldNum" sz="quarter" idx="12"/>
+          </p:nvPr>
+        </p:nvSpPr>
+        <p:spPr/>
+        <p:txBody>
+          <a:bodyPr/>
+          <a:lstStyle/>
+          <a:p>
+            <a:fld id="{2B25DBF2-E2F2-498E-8F35-AC746470812A}" type="slidenum">
+              <a:rPr lang="en-US" smtClean="0"/>
+              <a:t>5</a:t>
+            </a:fld>
+            <a:endParaRPr lang="en-US"/>
+          </a:p>
+        </p:txBody>
+      </p:sp>
     </p:spTree>
     <p:extLst>
       <p:ext uri="{BB962C8B-B14F-4D97-AF65-F5344CB8AC3E}">
@@ -10652,13 +11679,6 @@
   <p:clrMapOvr>
     <a:masterClrMapping/>
   </p:clrMapOvr>
-  <p:timing>
-    <p:tnLst>
-      <p:par>
-        <p:cTn id="1" dur="indefinite" restart="never" nodeType="tmRoot"/>
-      </p:par>
-    </p:tnLst>
-  </p:timing>
 </p:sld>
 </file>
 
@@ -10708,6 +11728,35 @@
           </a:xfrm>
         </p:spPr>
       </p:pic>
+      <p:sp>
+        <p:nvSpPr>
+          <p:cNvPr id="2" name="Slide Number Placeholder 1">
+            <a:extLst>
+              <a:ext uri="{FF2B5EF4-FFF2-40B4-BE49-F238E27FC236}">
+                <a16:creationId xmlns:a16="http://schemas.microsoft.com/office/drawing/2014/main" id="{CFAE56CD-CB74-462D-9319-8212DEBC65A0}"/>
+              </a:ext>
+            </a:extLst>
+          </p:cNvPr>
+          <p:cNvSpPr>
+            <a:spLocks noGrp="1"/>
+          </p:cNvSpPr>
+          <p:nvPr>
+            <p:ph type="sldNum" sz="quarter" idx="12"/>
+          </p:nvPr>
+        </p:nvSpPr>
+        <p:spPr/>
+        <p:txBody>
+          <a:bodyPr/>
+          <a:lstStyle/>
+          <a:p>
+            <a:fld id="{2B25DBF2-E2F2-498E-8F35-AC746470812A}" type="slidenum">
+              <a:rPr lang="en-US" smtClean="0"/>
+              <a:t>6</a:t>
+            </a:fld>
+            <a:endParaRPr lang="en-US"/>
+          </a:p>
+        </p:txBody>
+      </p:sp>
     </p:spTree>
     <p:extLst>
       <p:ext uri="{BB962C8B-B14F-4D97-AF65-F5344CB8AC3E}">
@@ -10767,6 +11816,35 @@
           </a:xfrm>
         </p:spPr>
       </p:pic>
+      <p:sp>
+        <p:nvSpPr>
+          <p:cNvPr id="2" name="Slide Number Placeholder 1">
+            <a:extLst>
+              <a:ext uri="{FF2B5EF4-FFF2-40B4-BE49-F238E27FC236}">
+                <a16:creationId xmlns:a16="http://schemas.microsoft.com/office/drawing/2014/main" id="{95380178-4636-4F82-BA0C-87C6360F653B}"/>
+              </a:ext>
+            </a:extLst>
+          </p:cNvPr>
+          <p:cNvSpPr>
+            <a:spLocks noGrp="1"/>
+          </p:cNvSpPr>
+          <p:nvPr>
+            <p:ph type="sldNum" sz="quarter" idx="12"/>
+          </p:nvPr>
+        </p:nvSpPr>
+        <p:spPr/>
+        <p:txBody>
+          <a:bodyPr/>
+          <a:lstStyle/>
+          <a:p>
+            <a:fld id="{2B25DBF2-E2F2-498E-8F35-AC746470812A}" type="slidenum">
+              <a:rPr lang="en-US" smtClean="0"/>
+              <a:t>7</a:t>
+            </a:fld>
+            <a:endParaRPr lang="en-US"/>
+          </a:p>
+        </p:txBody>
+      </p:sp>
     </p:spTree>
     <p:extLst>
       <p:ext uri="{BB962C8B-B14F-4D97-AF65-F5344CB8AC3E}">
@@ -10826,6 +11904,35 @@
           </a:xfrm>
         </p:spPr>
       </p:pic>
+      <p:sp>
+        <p:nvSpPr>
+          <p:cNvPr id="2" name="Slide Number Placeholder 1">
+            <a:extLst>
+              <a:ext uri="{FF2B5EF4-FFF2-40B4-BE49-F238E27FC236}">
+                <a16:creationId xmlns:a16="http://schemas.microsoft.com/office/drawing/2014/main" id="{8F65A3BD-0AC6-4720-B302-D25295C07792}"/>
+              </a:ext>
+            </a:extLst>
+          </p:cNvPr>
+          <p:cNvSpPr>
+            <a:spLocks noGrp="1"/>
+          </p:cNvSpPr>
+          <p:nvPr>
+            <p:ph type="sldNum" sz="quarter" idx="12"/>
+          </p:nvPr>
+        </p:nvSpPr>
+        <p:spPr/>
+        <p:txBody>
+          <a:bodyPr/>
+          <a:lstStyle/>
+          <a:p>
+            <a:fld id="{2B25DBF2-E2F2-498E-8F35-AC746470812A}" type="slidenum">
+              <a:rPr lang="en-US" smtClean="0"/>
+              <a:t>8</a:t>
+            </a:fld>
+            <a:endParaRPr lang="en-US"/>
+          </a:p>
+        </p:txBody>
+      </p:sp>
     </p:spTree>
     <p:extLst>
       <p:ext uri="{BB962C8B-B14F-4D97-AF65-F5344CB8AC3E}">
@@ -10885,6 +11992,35 @@
           </a:xfrm>
         </p:spPr>
       </p:pic>
+      <p:sp>
+        <p:nvSpPr>
+          <p:cNvPr id="2" name="Slide Number Placeholder 1">
+            <a:extLst>
+              <a:ext uri="{FF2B5EF4-FFF2-40B4-BE49-F238E27FC236}">
+                <a16:creationId xmlns:a16="http://schemas.microsoft.com/office/drawing/2014/main" id="{9BB9CB08-1643-491D-8EAC-4C97D9144E76}"/>
+              </a:ext>
+            </a:extLst>
+          </p:cNvPr>
+          <p:cNvSpPr>
+            <a:spLocks noGrp="1"/>
+          </p:cNvSpPr>
+          <p:nvPr>
+            <p:ph type="sldNum" sz="quarter" idx="12"/>
+          </p:nvPr>
+        </p:nvSpPr>
+        <p:spPr/>
+        <p:txBody>
+          <a:bodyPr/>
+          <a:lstStyle/>
+          <a:p>
+            <a:fld id="{2B25DBF2-E2F2-498E-8F35-AC746470812A}" type="slidenum">
+              <a:rPr lang="en-US" smtClean="0"/>
+              <a:t>9</a:t>
+            </a:fld>
+            <a:endParaRPr lang="en-US"/>
+          </a:p>
+        </p:txBody>
+      </p:sp>
     </p:spTree>
     <p:extLst>
       <p:ext uri="{BB962C8B-B14F-4D97-AF65-F5344CB8AC3E}">
@@ -11139,4 +12275,299 @@
     </a:ext>
   </a:extLst>
 </a:theme>
+</file>
+
+<file path=ppt/theme/theme2.xml><?xml version="1.0" encoding="utf-8"?>
+<a:theme xmlns:a="http://schemas.openxmlformats.org/drawingml/2006/main" name="Office Theme">
+  <a:themeElements>
+    <a:clrScheme name="Office">
+      <a:dk1>
+        <a:sysClr val="windowText" lastClr="000000"/>
+      </a:dk1>
+      <a:lt1>
+        <a:sysClr val="window" lastClr="FFFFFF"/>
+      </a:lt1>
+      <a:dk2>
+        <a:srgbClr val="44546A"/>
+      </a:dk2>
+      <a:lt2>
+        <a:srgbClr val="E7E6E6"/>
+      </a:lt2>
+      <a:accent1>
+        <a:srgbClr val="4472C4"/>
+      </a:accent1>
+      <a:accent2>
+        <a:srgbClr val="ED7D31"/>
+      </a:accent2>
+      <a:accent3>
+        <a:srgbClr val="A5A5A5"/>
+      </a:accent3>
+      <a:accent4>
+        <a:srgbClr val="FFC000"/>
+      </a:accent4>
+      <a:accent5>
+        <a:srgbClr val="5B9BD5"/>
+      </a:accent5>
+      <a:accent6>
+        <a:srgbClr val="70AD47"/>
+      </a:accent6>
+      <a:hlink>
+        <a:srgbClr val="0563C1"/>
+      </a:hlink>
+      <a:folHlink>
+        <a:srgbClr val="954F72"/>
+      </a:folHlink>
+    </a:clrScheme>
+    <a:fontScheme name="Office">
+      <a:majorFont>
+        <a:latin typeface="Calibri Light" panose="020F0302020204030204"/>
+        <a:ea typeface=""/>
+        <a:cs typeface=""/>
+        <a:font script="Jpan" typeface="游ゴシック Light"/>
+        <a:font script="Hang" typeface="맑은 고딕"/>
+        <a:font script="Hans" typeface="等线 Light"/>
+        <a:font script="Hant" typeface="新細明體"/>
+        <a:font script="Arab" typeface="Times New Roman"/>
+        <a:font script="Hebr" typeface="Times New Roman"/>
+        <a:font script="Thai" typeface="Angsana New"/>
+        <a:font script="Ethi" typeface="Nyala"/>
+        <a:font script="Beng" typeface="Vrinda"/>
+        <a:font script="Gujr" typeface="Shruti"/>
+        <a:font script="Khmr" typeface="MoolBoran"/>
+        <a:font script="Knda" typeface="Tunga"/>
+        <a:font script="Guru" typeface="Raavi"/>
+        <a:font script="Cans" typeface="Euphemia"/>
+        <a:font script="Cher" typeface="Plantagenet Cherokee"/>
+        <a:font script="Yiii" typeface="Microsoft Yi Baiti"/>
+        <a:font script="Tibt" typeface="Microsoft Himalaya"/>
+        <a:font script="Thaa" typeface="MV Boli"/>
+        <a:font script="Deva" typeface="Mangal"/>
+        <a:font script="Telu" typeface="Gautami"/>
+        <a:font script="Taml" typeface="Latha"/>
+        <a:font script="Syrc" typeface="Estrangelo Edessa"/>
+        <a:font script="Orya" typeface="Kalinga"/>
+        <a:font script="Mlym" typeface="Kartika"/>
+        <a:font script="Laoo" typeface="DokChampa"/>
+        <a:font script="Sinh" typeface="Iskoola Pota"/>
+        <a:font script="Mong" typeface="Mongolian Baiti"/>
+        <a:font script="Viet" typeface="Times New Roman"/>
+        <a:font script="Uigh" typeface="Microsoft Uighur"/>
+        <a:font script="Geor" typeface="Sylfaen"/>
+        <a:font script="Armn" typeface="Arial"/>
+        <a:font script="Bugi" typeface="Leelawadee UI"/>
+        <a:font script="Bopo" typeface="Microsoft JhengHei"/>
+        <a:font script="Java" typeface="Javanese Text"/>
+        <a:font script="Lisu" typeface="Segoe UI"/>
+        <a:font script="Mymr" typeface="Myanmar Text"/>
+        <a:font script="Nkoo" typeface="Ebrima"/>
+        <a:font script="Olck" typeface="Nirmala UI"/>
+        <a:font script="Osma" typeface="Ebrima"/>
+        <a:font script="Phag" typeface="Phagspa"/>
+        <a:font script="Syrn" typeface="Estrangelo Edessa"/>
+        <a:font script="Syrj" typeface="Estrangelo Edessa"/>
+        <a:font script="Syre" typeface="Estrangelo Edessa"/>
+        <a:font script="Sora" typeface="Nirmala UI"/>
+        <a:font script="Tale" typeface="Microsoft Tai Le"/>
+        <a:font script="Talu" typeface="Microsoft New Tai Lue"/>
+        <a:font script="Tfng" typeface="Ebrima"/>
+      </a:majorFont>
+      <a:minorFont>
+        <a:latin typeface="Calibri" panose="020F0502020204030204"/>
+        <a:ea typeface=""/>
+        <a:cs typeface=""/>
+        <a:font script="Jpan" typeface="游ゴシック"/>
+        <a:font script="Hang" typeface="맑은 고딕"/>
+        <a:font script="Hans" typeface="等线"/>
+        <a:font script="Hant" typeface="新細明體"/>
+        <a:font script="Arab" typeface="Arial"/>
+        <a:font script="Hebr" typeface="Arial"/>
+        <a:font script="Thai" typeface="Cordia New"/>
+        <a:font script="Ethi" typeface="Nyala"/>
+        <a:font script="Beng" typeface="Vrinda"/>
+        <a:font script="Gujr" typeface="Shruti"/>
+        <a:font script="Khmr" typeface="DaunPenh"/>
+        <a:font script="Knda" typeface="Tunga"/>
+        <a:font script="Guru" typeface="Raavi"/>
+        <a:font script="Cans" typeface="Euphemia"/>
+        <a:font script="Cher" typeface="Plantagenet Cherokee"/>
+        <a:font script="Yiii" typeface="Microsoft Yi Baiti"/>
+        <a:font script="Tibt" typeface="Microsoft Himalaya"/>
+        <a:font script="Thaa" typeface="MV Boli"/>
+        <a:font script="Deva" typeface="Mangal"/>
+        <a:font script="Telu" typeface="Gautami"/>
+        <a:font script="Taml" typeface="Latha"/>
+        <a:font script="Syrc" typeface="Estrangelo Edessa"/>
+        <a:font script="Orya" typeface="Kalinga"/>
+        <a:font script="Mlym" typeface="Kartika"/>
+        <a:font script="Laoo" typeface="DokChampa"/>
+        <a:font script="Sinh" typeface="Iskoola Pota"/>
+        <a:font script="Mong" typeface="Mongolian Baiti"/>
+        <a:font script="Viet" typeface="Arial"/>
+        <a:font script="Uigh" typeface="Microsoft Uighur"/>
+        <a:font script="Geor" typeface="Sylfaen"/>
+        <a:font script="Armn" typeface="Arial"/>
+        <a:font script="Bugi" typeface="Leelawadee UI"/>
+        <a:font script="Bopo" typeface="Microsoft JhengHei"/>
+        <a:font script="Java" typeface="Javanese Text"/>
+        <a:font script="Lisu" typeface="Segoe UI"/>
+        <a:font script="Mymr" typeface="Myanmar Text"/>
+        <a:font script="Nkoo" typeface="Ebrima"/>
+        <a:font script="Olck" typeface="Nirmala UI"/>
+        <a:font script="Osma" typeface="Ebrima"/>
+        <a:font script="Phag" typeface="Phagspa"/>
+        <a:font script="Syrn" typeface="Estrangelo Edessa"/>
+        <a:font script="Syrj" typeface="Estrangelo Edessa"/>
+        <a:font script="Syre" typeface="Estrangelo Edessa"/>
+        <a:font script="Sora" typeface="Nirmala UI"/>
+        <a:font script="Tale" typeface="Microsoft Tai Le"/>
+        <a:font script="Talu" typeface="Microsoft New Tai Lue"/>
+        <a:font script="Tfng" typeface="Ebrima"/>
+      </a:minorFont>
+    </a:fontScheme>
+    <a:fmtScheme name="Office">
+      <a:fillStyleLst>
+        <a:solidFill>
+          <a:schemeClr val="phClr"/>
+        </a:solidFill>
+        <a:gradFill rotWithShape="1">
+          <a:gsLst>
+            <a:gs pos="0">
+              <a:schemeClr val="phClr">
+                <a:lumMod val="110000"/>
+                <a:satMod val="105000"/>
+                <a:tint val="67000"/>
+              </a:schemeClr>
+            </a:gs>
+            <a:gs pos="50000">
+              <a:schemeClr val="phClr">
+                <a:lumMod val="105000"/>
+                <a:satMod val="103000"/>
+                <a:tint val="73000"/>
+              </a:schemeClr>
+            </a:gs>
+            <a:gs pos="100000">
+              <a:schemeClr val="phClr">
+                <a:lumMod val="105000"/>
+                <a:satMod val="109000"/>
+                <a:tint val="81000"/>
+              </a:schemeClr>
+            </a:gs>
+          </a:gsLst>
+          <a:lin ang="5400000" scaled="0"/>
+        </a:gradFill>
+        <a:gradFill rotWithShape="1">
+          <a:gsLst>
+            <a:gs pos="0">
+              <a:schemeClr val="phClr">
+                <a:satMod val="103000"/>
+                <a:lumMod val="102000"/>
+                <a:tint val="94000"/>
+              </a:schemeClr>
+            </a:gs>
+            <a:gs pos="50000">
+              <a:schemeClr val="phClr">
+                <a:satMod val="110000"/>
+                <a:lumMod val="100000"/>
+                <a:shade val="100000"/>
+              </a:schemeClr>
+            </a:gs>
+            <a:gs pos="100000">
+              <a:schemeClr val="phClr">
+                <a:lumMod val="99000"/>
+                <a:satMod val="120000"/>
+                <a:shade val="78000"/>
+              </a:schemeClr>
+            </a:gs>
+          </a:gsLst>
+          <a:lin ang="5400000" scaled="0"/>
+        </a:gradFill>
+      </a:fillStyleLst>
+      <a:lnStyleLst>
+        <a:ln w="6350" cap="flat" cmpd="sng" algn="ctr">
+          <a:solidFill>
+            <a:schemeClr val="phClr"/>
+          </a:solidFill>
+          <a:prstDash val="solid"/>
+          <a:miter lim="800000"/>
+        </a:ln>
+        <a:ln w="12700" cap="flat" cmpd="sng" algn="ctr">
+          <a:solidFill>
+            <a:schemeClr val="phClr"/>
+          </a:solidFill>
+          <a:prstDash val="solid"/>
+          <a:miter lim="800000"/>
+        </a:ln>
+        <a:ln w="19050" cap="flat" cmpd="sng" algn="ctr">
+          <a:solidFill>
+            <a:schemeClr val="phClr"/>
+          </a:solidFill>
+          <a:prstDash val="solid"/>
+          <a:miter lim="800000"/>
+        </a:ln>
+      </a:lnStyleLst>
+      <a:effectStyleLst>
+        <a:effectStyle>
+          <a:effectLst/>
+        </a:effectStyle>
+        <a:effectStyle>
+          <a:effectLst/>
+        </a:effectStyle>
+        <a:effectStyle>
+          <a:effectLst>
+            <a:outerShdw blurRad="57150" dist="19050" dir="5400000" algn="ctr" rotWithShape="0">
+              <a:srgbClr val="000000">
+                <a:alpha val="63000"/>
+              </a:srgbClr>
+            </a:outerShdw>
+          </a:effectLst>
+        </a:effectStyle>
+      </a:effectStyleLst>
+      <a:bgFillStyleLst>
+        <a:solidFill>
+          <a:schemeClr val="phClr"/>
+        </a:solidFill>
+        <a:solidFill>
+          <a:schemeClr val="phClr">
+            <a:tint val="95000"/>
+            <a:satMod val="170000"/>
+          </a:schemeClr>
+        </a:solidFill>
+        <a:gradFill rotWithShape="1">
+          <a:gsLst>
+            <a:gs pos="0">
+              <a:schemeClr val="phClr">
+                <a:tint val="93000"/>
+                <a:satMod val="150000"/>
+                <a:shade val="98000"/>
+                <a:lumMod val="102000"/>
+              </a:schemeClr>
+            </a:gs>
+            <a:gs pos="50000">
+              <a:schemeClr val="phClr">
+                <a:tint val="98000"/>
+                <a:satMod val="130000"/>
+                <a:shade val="90000"/>
+                <a:lumMod val="103000"/>
+              </a:schemeClr>
+            </a:gs>
+            <a:gs pos="100000">
+              <a:schemeClr val="phClr">
+                <a:shade val="63000"/>
+                <a:satMod val="120000"/>
+              </a:schemeClr>
+            </a:gs>
+          </a:gsLst>
+          <a:lin ang="5400000" scaled="0"/>
+        </a:gradFill>
+      </a:bgFillStyleLst>
+    </a:fmtScheme>
+  </a:themeElements>
+  <a:objectDefaults/>
+  <a:extraClrSchemeLst/>
+  <a:extLst>
+    <a:ext uri="{05A4C25C-085E-4340-85A3-A5531E510DB2}">
+      <thm15:themeFamily xmlns:thm15="http://schemas.microsoft.com/office/thememl/2012/main" name="Office Theme" id="{62F939B6-93AF-4DB8-9C6B-D6C7DFDC589F}" vid="{4A3C46E8-61CC-4603-A589-7422A47A8E4A}"/>
+    </a:ext>
+  </a:extLst>
+</a:theme>
 </file>
</xml_diff>